<commit_message>
03_Team_RayForge_Release_Management-Präsentation.pptx: Erste Präsentations-Platzhalter eingefügt.
</commit_message>
<xml_diff>
--- a/3. Präsentation/3.1 Präsentationsunterlagen/03_Team_RayForge_Release_Management-Präsentation.pptx
+++ b/3. Präsentation/3.1 Präsentationsunterlagen/03_Team_RayForge_Release_Management-Präsentation.pptx
@@ -6,6 +6,11 @@
   </p:sldMasterIdLst>
   <p:sldIdLst>
     <p:sldId id="256" r:id="rId2"/>
+    <p:sldId id="278" r:id="rId3"/>
+    <p:sldId id="271" r:id="rId4"/>
+    <p:sldId id="273" r:id="rId5"/>
+    <p:sldId id="275" r:id="rId6"/>
+    <p:sldId id="269" r:id="rId7"/>
   </p:sldIdLst>
   <p:sldSz cx="12192000" cy="6858000"/>
   <p:notesSz cx="6858000" cy="9144000"/>
@@ -112,8 +117,264 @@
 </p:presentation>
 </file>
 
+<file path=ppt/revisionInfo.xml><?xml version="1.0" encoding="utf-8"?>
+<p1510:revInfo xmlns:a="http://schemas.openxmlformats.org/drawingml/2006/main" xmlns:r="http://schemas.openxmlformats.org/officeDocument/2006/relationships" xmlns:p1510="http://schemas.microsoft.com/office/powerpoint/2015/10/main">
+  <p1510:revLst>
+    <p1510:client id="{B71741F6-CF87-4CED-93FF-C8C60DA59251}" v="13" dt="2025-01-19T21:23:39.314"/>
+  </p1510:revLst>
+</p1510:revInfo>
+</file>
+
 <file path=ppt/changesInfos/changesInfo1.xml><?xml version="1.0" encoding="utf-8"?>
 <pc:chgInfo xmlns:a="http://schemas.openxmlformats.org/drawingml/2006/main" xmlns:r="http://schemas.openxmlformats.org/officeDocument/2006/relationships" xmlns:ac="http://schemas.microsoft.com/office/drawing/2013/main/command" xmlns:pc="http://schemas.microsoft.com/office/powerpoint/2013/main/command">
+  <pc:docChgLst>
+    <pc:chgData name="Jeckle, Lukas" userId="8af323fd-999f-415a-b7cf-a75b87c7bd04" providerId="ADAL" clId="{B71741F6-CF87-4CED-93FF-C8C60DA59251}"/>
+    <pc:docChg chg="undo custSel addSld delSld modSld sldOrd">
+      <pc:chgData name="Jeckle, Lukas" userId="8af323fd-999f-415a-b7cf-a75b87c7bd04" providerId="ADAL" clId="{B71741F6-CF87-4CED-93FF-C8C60DA59251}" dt="2025-01-19T21:24:11.408" v="133" actId="47"/>
+      <pc:docMkLst>
+        <pc:docMk/>
+      </pc:docMkLst>
+      <pc:sldChg chg="modSp mod">
+        <pc:chgData name="Jeckle, Lukas" userId="8af323fd-999f-415a-b7cf-a75b87c7bd04" providerId="ADAL" clId="{B71741F6-CF87-4CED-93FF-C8C60DA59251}" dt="2025-01-19T21:01:17.020" v="19" actId="1035"/>
+        <pc:sldMkLst>
+          <pc:docMk/>
+          <pc:sldMk cId="3716837480" sldId="256"/>
+        </pc:sldMkLst>
+        <pc:spChg chg="mod">
+          <ac:chgData name="Jeckle, Lukas" userId="8af323fd-999f-415a-b7cf-a75b87c7bd04" providerId="ADAL" clId="{B71741F6-CF87-4CED-93FF-C8C60DA59251}" dt="2025-01-19T21:01:17.020" v="19" actId="1035"/>
+          <ac:spMkLst>
+            <pc:docMk/>
+            <pc:sldMk cId="3716837480" sldId="256"/>
+            <ac:spMk id="16" creationId="{E9AEDF7E-8FE1-7004-C7D8-794A8D004B77}"/>
+          </ac:spMkLst>
+        </pc:spChg>
+      </pc:sldChg>
+      <pc:sldChg chg="delSp add del setBg delDesignElem">
+        <pc:chgData name="Jeckle, Lukas" userId="8af323fd-999f-415a-b7cf-a75b87c7bd04" providerId="ADAL" clId="{B71741F6-CF87-4CED-93FF-C8C60DA59251}" dt="2025-01-19T21:01:47.304" v="25" actId="47"/>
+        <pc:sldMkLst>
+          <pc:docMk/>
+          <pc:sldMk cId="3495534188" sldId="269"/>
+        </pc:sldMkLst>
+        <pc:spChg chg="del">
+          <ac:chgData name="Jeckle, Lukas" userId="8af323fd-999f-415a-b7cf-a75b87c7bd04" providerId="ADAL" clId="{B71741F6-CF87-4CED-93FF-C8C60DA59251}" dt="2025-01-19T20:59:47.028" v="5"/>
+          <ac:spMkLst>
+            <pc:docMk/>
+            <pc:sldMk cId="3495534188" sldId="269"/>
+            <ac:spMk id="8" creationId="{4DA718D0-4865-4629-8134-44F68D41D574}"/>
+          </ac:spMkLst>
+        </pc:spChg>
+        <pc:spChg chg="del">
+          <ac:chgData name="Jeckle, Lukas" userId="8af323fd-999f-415a-b7cf-a75b87c7bd04" providerId="ADAL" clId="{B71741F6-CF87-4CED-93FF-C8C60DA59251}" dt="2025-01-19T20:59:47.028" v="5"/>
+          <ac:spMkLst>
+            <pc:docMk/>
+            <pc:sldMk cId="3495534188" sldId="269"/>
+            <ac:spMk id="14" creationId="{CBC4F608-B4B8-48C3-9572-C0F061B1CD99}"/>
+          </ac:spMkLst>
+        </pc:spChg>
+        <pc:grpChg chg="del">
+          <ac:chgData name="Jeckle, Lukas" userId="8af323fd-999f-415a-b7cf-a75b87c7bd04" providerId="ADAL" clId="{B71741F6-CF87-4CED-93FF-C8C60DA59251}" dt="2025-01-19T20:59:47.028" v="5"/>
+          <ac:grpSpMkLst>
+            <pc:docMk/>
+            <pc:sldMk cId="3495534188" sldId="269"/>
+            <ac:grpSpMk id="10" creationId="{65167ED7-6315-43AB-B1B6-C326D5FD8F84}"/>
+          </ac:grpSpMkLst>
+        </pc:grpChg>
+      </pc:sldChg>
+      <pc:sldChg chg="modSp add mod ord">
+        <pc:chgData name="Jeckle, Lukas" userId="8af323fd-999f-415a-b7cf-a75b87c7bd04" providerId="ADAL" clId="{B71741F6-CF87-4CED-93FF-C8C60DA59251}" dt="2025-01-19T21:04:53.276" v="83"/>
+        <pc:sldMkLst>
+          <pc:docMk/>
+          <pc:sldMk cId="3784528720" sldId="271"/>
+        </pc:sldMkLst>
+        <pc:spChg chg="mod">
+          <ac:chgData name="Jeckle, Lukas" userId="8af323fd-999f-415a-b7cf-a75b87c7bd04" providerId="ADAL" clId="{B71741F6-CF87-4CED-93FF-C8C60DA59251}" dt="2025-01-19T21:01:10.297" v="16" actId="1076"/>
+          <ac:spMkLst>
+            <pc:docMk/>
+            <pc:sldMk cId="3784528720" sldId="271"/>
+            <ac:spMk id="16" creationId="{60A235CB-7DDE-1592-B891-93A024E5D54A}"/>
+          </ac:spMkLst>
+        </pc:spChg>
+      </pc:sldChg>
+      <pc:sldChg chg="modSp add mod">
+        <pc:chgData name="Jeckle, Lukas" userId="8af323fd-999f-415a-b7cf-a75b87c7bd04" providerId="ADAL" clId="{B71741F6-CF87-4CED-93FF-C8C60DA59251}" dt="2025-01-19T21:03:55.068" v="44" actId="1076"/>
+        <pc:sldMkLst>
+          <pc:docMk/>
+          <pc:sldMk cId="3045535258" sldId="273"/>
+        </pc:sldMkLst>
+        <pc:spChg chg="mod">
+          <ac:chgData name="Jeckle, Lukas" userId="8af323fd-999f-415a-b7cf-a75b87c7bd04" providerId="ADAL" clId="{B71741F6-CF87-4CED-93FF-C8C60DA59251}" dt="2025-01-19T21:03:55.068" v="44" actId="1076"/>
+          <ac:spMkLst>
+            <pc:docMk/>
+            <pc:sldMk cId="3045535258" sldId="273"/>
+            <ac:spMk id="5" creationId="{19BE3AE4-8D6C-FD7E-5290-8593F72729C2}"/>
+          </ac:spMkLst>
+        </pc:spChg>
+        <pc:spChg chg="mod">
+          <ac:chgData name="Jeckle, Lukas" userId="8af323fd-999f-415a-b7cf-a75b87c7bd04" providerId="ADAL" clId="{B71741F6-CF87-4CED-93FF-C8C60DA59251}" dt="2025-01-19T21:01:03.365" v="15" actId="1035"/>
+          <ac:spMkLst>
+            <pc:docMk/>
+            <pc:sldMk cId="3045535258" sldId="273"/>
+            <ac:spMk id="16" creationId="{2C216DE8-44FA-1A8D-0415-F106B095E6B9}"/>
+          </ac:spMkLst>
+        </pc:spChg>
+        <pc:picChg chg="mod">
+          <ac:chgData name="Jeckle, Lukas" userId="8af323fd-999f-415a-b7cf-a75b87c7bd04" providerId="ADAL" clId="{B71741F6-CF87-4CED-93FF-C8C60DA59251}" dt="2025-01-19T21:03:49.591" v="43" actId="1035"/>
+          <ac:picMkLst>
+            <pc:docMk/>
+            <pc:sldMk cId="3045535258" sldId="273"/>
+            <ac:picMk id="4" creationId="{3D57B45B-B086-8011-BA1D-C1CB9D3C1A5B}"/>
+          </ac:picMkLst>
+        </pc:picChg>
+      </pc:sldChg>
+      <pc:sldChg chg="modSp add del mod">
+        <pc:chgData name="Jeckle, Lukas" userId="8af323fd-999f-415a-b7cf-a75b87c7bd04" providerId="ADAL" clId="{B71741F6-CF87-4CED-93FF-C8C60DA59251}" dt="2025-01-19T21:01:49.804" v="27" actId="47"/>
+        <pc:sldMkLst>
+          <pc:docMk/>
+          <pc:sldMk cId="1410503594" sldId="275"/>
+        </pc:sldMkLst>
+        <pc:spChg chg="mod">
+          <ac:chgData name="Jeckle, Lukas" userId="8af323fd-999f-415a-b7cf-a75b87c7bd04" providerId="ADAL" clId="{B71741F6-CF87-4CED-93FF-C8C60DA59251}" dt="2025-01-19T21:01:25.237" v="21" actId="1036"/>
+          <ac:spMkLst>
+            <pc:docMk/>
+            <pc:sldMk cId="1410503594" sldId="275"/>
+            <ac:spMk id="16" creationId="{E2F8C310-BDA6-CAC0-A8C2-2D6197182FE6}"/>
+          </ac:spMkLst>
+        </pc:spChg>
+      </pc:sldChg>
+      <pc:sldChg chg="delSp add del setBg delDesignElem">
+        <pc:chgData name="Jeckle, Lukas" userId="8af323fd-999f-415a-b7cf-a75b87c7bd04" providerId="ADAL" clId="{B71741F6-CF87-4CED-93FF-C8C60DA59251}" dt="2025-01-19T21:01:46.547" v="24" actId="47"/>
+        <pc:sldMkLst>
+          <pc:docMk/>
+          <pc:sldMk cId="2190187220" sldId="276"/>
+        </pc:sldMkLst>
+        <pc:spChg chg="del">
+          <ac:chgData name="Jeckle, Lukas" userId="8af323fd-999f-415a-b7cf-a75b87c7bd04" providerId="ADAL" clId="{B71741F6-CF87-4CED-93FF-C8C60DA59251}" dt="2025-01-19T21:01:42.635" v="23"/>
+          <ac:spMkLst>
+            <pc:docMk/>
+            <pc:sldMk cId="2190187220" sldId="276"/>
+            <ac:spMk id="8" creationId="{4DA718D0-4865-4629-8134-44F68D41D574}"/>
+          </ac:spMkLst>
+        </pc:spChg>
+        <pc:spChg chg="del">
+          <ac:chgData name="Jeckle, Lukas" userId="8af323fd-999f-415a-b7cf-a75b87c7bd04" providerId="ADAL" clId="{B71741F6-CF87-4CED-93FF-C8C60DA59251}" dt="2025-01-19T21:01:42.635" v="23"/>
+          <ac:spMkLst>
+            <pc:docMk/>
+            <pc:sldMk cId="2190187220" sldId="276"/>
+            <ac:spMk id="14" creationId="{CBC4F608-B4B8-48C3-9572-C0F061B1CD99}"/>
+          </ac:spMkLst>
+        </pc:spChg>
+        <pc:grpChg chg="del">
+          <ac:chgData name="Jeckle, Lukas" userId="8af323fd-999f-415a-b7cf-a75b87c7bd04" providerId="ADAL" clId="{B71741F6-CF87-4CED-93FF-C8C60DA59251}" dt="2025-01-19T21:01:42.635" v="23"/>
+          <ac:grpSpMkLst>
+            <pc:docMk/>
+            <pc:sldMk cId="2190187220" sldId="276"/>
+            <ac:grpSpMk id="10" creationId="{65167ED7-6315-43AB-B1B6-C326D5FD8F84}"/>
+          </ac:grpSpMkLst>
+        </pc:grpChg>
+      </pc:sldChg>
+      <pc:sldChg chg="add del">
+        <pc:chgData name="Jeckle, Lukas" userId="8af323fd-999f-415a-b7cf-a75b87c7bd04" providerId="ADAL" clId="{B71741F6-CF87-4CED-93FF-C8C60DA59251}" dt="2025-01-19T21:00:15.206" v="6" actId="47"/>
+        <pc:sldMkLst>
+          <pc:docMk/>
+          <pc:sldMk cId="3774466728" sldId="277"/>
+        </pc:sldMkLst>
+      </pc:sldChg>
+      <pc:sldChg chg="modSp add mod">
+        <pc:chgData name="Jeckle, Lukas" userId="8af323fd-999f-415a-b7cf-a75b87c7bd04" providerId="ADAL" clId="{B71741F6-CF87-4CED-93FF-C8C60DA59251}" dt="2025-01-19T21:04:40.356" v="81" actId="20577"/>
+        <pc:sldMkLst>
+          <pc:docMk/>
+          <pc:sldMk cId="4018529521" sldId="278"/>
+        </pc:sldMkLst>
+        <pc:spChg chg="mod">
+          <ac:chgData name="Jeckle, Lukas" userId="8af323fd-999f-415a-b7cf-a75b87c7bd04" providerId="ADAL" clId="{B71741F6-CF87-4CED-93FF-C8C60DA59251}" dt="2025-01-19T21:04:40.356" v="81" actId="20577"/>
+          <ac:spMkLst>
+            <pc:docMk/>
+            <pc:sldMk cId="4018529521" sldId="278"/>
+            <ac:spMk id="16" creationId="{9BD7D0F2-4BBA-E38A-42E1-A1848F7F11ED}"/>
+          </ac:spMkLst>
+        </pc:spChg>
+      </pc:sldChg>
+      <pc:sldChg chg="addSp delSp modSp add del mod modClrScheme chgLayout">
+        <pc:chgData name="Jeckle, Lukas" userId="8af323fd-999f-415a-b7cf-a75b87c7bd04" providerId="ADAL" clId="{B71741F6-CF87-4CED-93FF-C8C60DA59251}" dt="2025-01-19T21:24:11.408" v="133" actId="47"/>
+        <pc:sldMkLst>
+          <pc:docMk/>
+          <pc:sldMk cId="1793859134" sldId="279"/>
+        </pc:sldMkLst>
+        <pc:spChg chg="add del mod ord">
+          <ac:chgData name="Jeckle, Lukas" userId="8af323fd-999f-415a-b7cf-a75b87c7bd04" providerId="ADAL" clId="{B71741F6-CF87-4CED-93FF-C8C60DA59251}" dt="2025-01-19T21:05:16.050" v="87" actId="700"/>
+          <ac:spMkLst>
+            <pc:docMk/>
+            <pc:sldMk cId="1793859134" sldId="279"/>
+            <ac:spMk id="4" creationId="{F2F2066E-2C59-D603-E284-42491044EC79}"/>
+          </ac:spMkLst>
+        </pc:spChg>
+        <pc:spChg chg="add del mod ord">
+          <ac:chgData name="Jeckle, Lukas" userId="8af323fd-999f-415a-b7cf-a75b87c7bd04" providerId="ADAL" clId="{B71741F6-CF87-4CED-93FF-C8C60DA59251}" dt="2025-01-19T21:05:16.050" v="87" actId="700"/>
+          <ac:spMkLst>
+            <pc:docMk/>
+            <pc:sldMk cId="1793859134" sldId="279"/>
+            <ac:spMk id="7" creationId="{DC73C229-6814-975A-F016-ADD5520BFA0E}"/>
+          </ac:spMkLst>
+        </pc:spChg>
+        <pc:spChg chg="add del mod ord">
+          <ac:chgData name="Jeckle, Lukas" userId="8af323fd-999f-415a-b7cf-a75b87c7bd04" providerId="ADAL" clId="{B71741F6-CF87-4CED-93FF-C8C60DA59251}" dt="2025-01-19T21:05:24.839" v="89" actId="478"/>
+          <ac:spMkLst>
+            <pc:docMk/>
+            <pc:sldMk cId="1793859134" sldId="279"/>
+            <ac:spMk id="8" creationId="{51CA2555-E600-B8FF-1D4C-9605831B1AC9}"/>
+          </ac:spMkLst>
+        </pc:spChg>
+        <pc:spChg chg="add del mod ord">
+          <ac:chgData name="Jeckle, Lukas" userId="8af323fd-999f-415a-b7cf-a75b87c7bd04" providerId="ADAL" clId="{B71741F6-CF87-4CED-93FF-C8C60DA59251}" dt="2025-01-19T21:05:26.342" v="90" actId="478"/>
+          <ac:spMkLst>
+            <pc:docMk/>
+            <pc:sldMk cId="1793859134" sldId="279"/>
+            <ac:spMk id="9" creationId="{1E014B36-7BD7-051E-7976-3E0D5161F7E2}"/>
+          </ac:spMkLst>
+        </pc:spChg>
+        <pc:spChg chg="add mod">
+          <ac:chgData name="Jeckle, Lukas" userId="8af323fd-999f-415a-b7cf-a75b87c7bd04" providerId="ADAL" clId="{B71741F6-CF87-4CED-93FF-C8C60DA59251}" dt="2025-01-19T21:24:02.046" v="131" actId="115"/>
+          <ac:spMkLst>
+            <pc:docMk/>
+            <pc:sldMk cId="1793859134" sldId="279"/>
+            <ac:spMk id="11" creationId="{73FB2D89-079C-84F4-AB20-F3FE701A11FA}"/>
+          </ac:spMkLst>
+        </pc:spChg>
+        <pc:spChg chg="mod">
+          <ac:chgData name="Jeckle, Lukas" userId="8af323fd-999f-415a-b7cf-a75b87c7bd04" providerId="ADAL" clId="{B71741F6-CF87-4CED-93FF-C8C60DA59251}" dt="2025-01-19T21:23:50.199" v="112" actId="20577"/>
+          <ac:spMkLst>
+            <pc:docMk/>
+            <pc:sldMk cId="1793859134" sldId="279"/>
+            <ac:spMk id="16" creationId="{B5ABA072-6490-D62F-4685-A096401865A5}"/>
+          </ac:spMkLst>
+        </pc:spChg>
+        <pc:graphicFrameChg chg="del">
+          <ac:chgData name="Jeckle, Lukas" userId="8af323fd-999f-415a-b7cf-a75b87c7bd04" providerId="ADAL" clId="{B71741F6-CF87-4CED-93FF-C8C60DA59251}" dt="2025-01-19T21:05:07.846" v="85" actId="478"/>
+          <ac:graphicFrameMkLst>
+            <pc:docMk/>
+            <pc:sldMk cId="1793859134" sldId="279"/>
+            <ac:graphicFrameMk id="6" creationId="{862DDA3E-CFE0-AC46-1C6E-28EBA882E51B}"/>
+          </ac:graphicFrameMkLst>
+        </pc:graphicFrameChg>
+        <pc:picChg chg="mod">
+          <ac:chgData name="Jeckle, Lukas" userId="8af323fd-999f-415a-b7cf-a75b87c7bd04" providerId="ADAL" clId="{B71741F6-CF87-4CED-93FF-C8C60DA59251}" dt="2025-01-19T21:24:10.138" v="132" actId="1076"/>
+          <ac:picMkLst>
+            <pc:docMk/>
+            <pc:sldMk cId="1793859134" sldId="279"/>
+            <ac:picMk id="5" creationId="{33324DFE-0D5A-3D9C-C97E-B4721A5CA0F9}"/>
+          </ac:picMkLst>
+        </pc:picChg>
+        <pc:picChg chg="add mod">
+          <ac:chgData name="Jeckle, Lukas" userId="8af323fd-999f-415a-b7cf-a75b87c7bd04" providerId="ADAL" clId="{B71741F6-CF87-4CED-93FF-C8C60DA59251}" dt="2025-01-19T21:05:20.797" v="88"/>
+          <ac:picMkLst>
+            <pc:docMk/>
+            <pc:sldMk cId="1793859134" sldId="279"/>
+            <ac:picMk id="10" creationId="{E1A63D49-0796-20EE-AEA6-5F55CA86491E}"/>
+          </ac:picMkLst>
+        </pc:picChg>
+      </pc:sldChg>
+    </pc:docChg>
+  </pc:docChgLst>
   <pc:docChgLst>
     <pc:chgData name="Jeckle, Lukas" userId="8af323fd-999f-415a-b7cf-a75b87c7bd04" providerId="ADAL" clId="{1E40712B-75F9-4204-BAC2-1D224ABAF16F}"/>
     <pc:docChg chg="modSld">
@@ -808,7 +1069,7 @@
           <a:p>
             <a:fld id="{A8A2DD3A-5327-4B48-8DC1-B98AEF751B34}" type="datetimeFigureOut">
               <a:rPr lang="en-US" smtClean="0"/>
-              <a:t>1/13/2025</a:t>
+              <a:t>1/19/2025</a:t>
             </a:fld>
             <a:endParaRPr lang="en-US"/>
           </a:p>
@@ -978,7 +1239,7 @@
           <a:p>
             <a:fld id="{A8A2DD3A-5327-4B48-8DC1-B98AEF751B34}" type="datetimeFigureOut">
               <a:rPr lang="en-US" smtClean="0"/>
-              <a:t>1/13/2025</a:t>
+              <a:t>1/19/2025</a:t>
             </a:fld>
             <a:endParaRPr lang="en-US"/>
           </a:p>
@@ -1158,7 +1419,7 @@
           <a:p>
             <a:fld id="{A8A2DD3A-5327-4B48-8DC1-B98AEF751B34}" type="datetimeFigureOut">
               <a:rPr lang="en-US" smtClean="0"/>
-              <a:t>1/13/2025</a:t>
+              <a:t>1/19/2025</a:t>
             </a:fld>
             <a:endParaRPr lang="en-US"/>
           </a:p>
@@ -1328,7 +1589,7 @@
           <a:p>
             <a:fld id="{A8A2DD3A-5327-4B48-8DC1-B98AEF751B34}" type="datetimeFigureOut">
               <a:rPr lang="en-US" smtClean="0"/>
-              <a:t>1/13/2025</a:t>
+              <a:t>1/19/2025</a:t>
             </a:fld>
             <a:endParaRPr lang="en-US"/>
           </a:p>
@@ -1574,7 +1835,7 @@
           <a:p>
             <a:fld id="{A8A2DD3A-5327-4B48-8DC1-B98AEF751B34}" type="datetimeFigureOut">
               <a:rPr lang="en-US" smtClean="0"/>
-              <a:t>1/13/2025</a:t>
+              <a:t>1/19/2025</a:t>
             </a:fld>
             <a:endParaRPr lang="en-US"/>
           </a:p>
@@ -1806,7 +2067,7 @@
           <a:p>
             <a:fld id="{A8A2DD3A-5327-4B48-8DC1-B98AEF751B34}" type="datetimeFigureOut">
               <a:rPr lang="en-US" smtClean="0"/>
-              <a:t>1/13/2025</a:t>
+              <a:t>1/19/2025</a:t>
             </a:fld>
             <a:endParaRPr lang="en-US"/>
           </a:p>
@@ -2173,7 +2434,7 @@
           <a:p>
             <a:fld id="{A8A2DD3A-5327-4B48-8DC1-B98AEF751B34}" type="datetimeFigureOut">
               <a:rPr lang="en-US" smtClean="0"/>
-              <a:t>1/13/2025</a:t>
+              <a:t>1/19/2025</a:t>
             </a:fld>
             <a:endParaRPr lang="en-US"/>
           </a:p>
@@ -2291,7 +2552,7 @@
           <a:p>
             <a:fld id="{A8A2DD3A-5327-4B48-8DC1-B98AEF751B34}" type="datetimeFigureOut">
               <a:rPr lang="en-US" smtClean="0"/>
-              <a:t>1/13/2025</a:t>
+              <a:t>1/19/2025</a:t>
             </a:fld>
             <a:endParaRPr lang="en-US"/>
           </a:p>
@@ -2386,7 +2647,7 @@
           <a:p>
             <a:fld id="{A8A2DD3A-5327-4B48-8DC1-B98AEF751B34}" type="datetimeFigureOut">
               <a:rPr lang="en-US" smtClean="0"/>
-              <a:t>1/13/2025</a:t>
+              <a:t>1/19/2025</a:t>
             </a:fld>
             <a:endParaRPr lang="en-US"/>
           </a:p>
@@ -2663,7 +2924,7 @@
           <a:p>
             <a:fld id="{A8A2DD3A-5327-4B48-8DC1-B98AEF751B34}" type="datetimeFigureOut">
               <a:rPr lang="en-US" smtClean="0"/>
-              <a:t>1/13/2025</a:t>
+              <a:t>1/19/2025</a:t>
             </a:fld>
             <a:endParaRPr lang="en-US"/>
           </a:p>
@@ -2920,7 +3181,7 @@
           <a:p>
             <a:fld id="{A8A2DD3A-5327-4B48-8DC1-B98AEF751B34}" type="datetimeFigureOut">
               <a:rPr lang="en-US" smtClean="0"/>
-              <a:t>1/13/2025</a:t>
+              <a:t>1/19/2025</a:t>
             </a:fld>
             <a:endParaRPr lang="en-US"/>
           </a:p>
@@ -3133,7 +3394,7 @@
           <a:p>
             <a:fld id="{A8A2DD3A-5327-4B48-8DC1-B98AEF751B34}" type="datetimeFigureOut">
               <a:rPr lang="en-US" smtClean="0"/>
-              <a:t>1/13/2025</a:t>
+              <a:t>1/19/2025</a:t>
             </a:fld>
             <a:endParaRPr lang="en-US"/>
           </a:p>
@@ -3587,7 +3848,7 @@
         </p:nvSpPr>
         <p:spPr>
           <a:xfrm>
-            <a:off x="584200" y="539728"/>
+            <a:off x="378530" y="552428"/>
             <a:ext cx="5668878" cy="727683"/>
           </a:xfrm>
           <a:prstGeom prst="rect">
@@ -3984,6 +4245,2342 @@
     <p:extLst>
       <p:ext uri="{BB962C8B-B14F-4D97-AF65-F5344CB8AC3E}">
         <p14:creationId xmlns:p14="http://schemas.microsoft.com/office/powerpoint/2010/main" val="3716837480"/>
+      </p:ext>
+    </p:extLst>
+  </p:cSld>
+  <p:clrMapOvr>
+    <a:masterClrMapping/>
+  </p:clrMapOvr>
+</p:sld>
+</file>
+
+<file path=ppt/slides/slide2.xml><?xml version="1.0" encoding="utf-8"?>
+<p:sld xmlns:a="http://schemas.openxmlformats.org/drawingml/2006/main" xmlns:r="http://schemas.openxmlformats.org/officeDocument/2006/relationships" xmlns:p="http://schemas.openxmlformats.org/presentationml/2006/main">
+  <p:cSld>
+    <p:spTree>
+      <p:nvGrpSpPr>
+        <p:cNvPr id="1" name="">
+          <a:extLst>
+            <a:ext uri="{FF2B5EF4-FFF2-40B4-BE49-F238E27FC236}">
+              <a16:creationId xmlns:a16="http://schemas.microsoft.com/office/drawing/2014/main" id="{48C8033E-AD64-F2B8-1664-17B8A6B913DE}"/>
+            </a:ext>
+          </a:extLst>
+        </p:cNvPr>
+        <p:cNvGrpSpPr/>
+        <p:nvPr/>
+      </p:nvGrpSpPr>
+      <p:grpSpPr>
+        <a:xfrm>
+          <a:off x="0" y="0"/>
+          <a:ext cx="0" cy="0"/>
+          <a:chOff x="0" y="0"/>
+          <a:chExt cx="0" cy="0"/>
+        </a:xfrm>
+      </p:grpSpPr>
+      <p:sp>
+        <p:nvSpPr>
+          <p:cNvPr id="16" name="Textfeld 15">
+            <a:extLst>
+              <a:ext uri="{FF2B5EF4-FFF2-40B4-BE49-F238E27FC236}">
+                <a16:creationId xmlns:a16="http://schemas.microsoft.com/office/drawing/2014/main" id="{9BD7D0F2-4BBA-E38A-42E1-A1848F7F11ED}"/>
+              </a:ext>
+            </a:extLst>
+          </p:cNvPr>
+          <p:cNvSpPr txBox="1"/>
+          <p:nvPr/>
+        </p:nvSpPr>
+        <p:spPr>
+          <a:xfrm>
+            <a:off x="799850" y="596878"/>
+            <a:ext cx="6509000" cy="707886"/>
+          </a:xfrm>
+          <a:prstGeom prst="rect">
+            <a:avLst/>
+          </a:prstGeom>
+          <a:noFill/>
+        </p:spPr>
+        <p:txBody>
+          <a:bodyPr wrap="square" rtlCol="0">
+            <a:spAutoFit/>
+          </a:bodyPr>
+          <a:lstStyle/>
+          <a:p>
+            <a:r>
+              <a:rPr lang="de-DE" sz="4000" b="1" u="sng" dirty="0"/>
+              <a:t>Unsere Software:</a:t>
+            </a:r>
+            <a:endParaRPr lang="de-DE" sz="4000" u="sng" dirty="0"/>
+          </a:p>
+        </p:txBody>
+      </p:sp>
+      <p:sp>
+        <p:nvSpPr>
+          <p:cNvPr id="2" name="Rectangle 1">
+            <a:extLst>
+              <a:ext uri="{FF2B5EF4-FFF2-40B4-BE49-F238E27FC236}">
+                <a16:creationId xmlns:a16="http://schemas.microsoft.com/office/drawing/2014/main" id="{FF8C70B5-F5D2-C94A-2D15-2A88CF9A2000}"/>
+              </a:ext>
+            </a:extLst>
+          </p:cNvPr>
+          <p:cNvSpPr/>
+          <p:nvPr/>
+        </p:nvSpPr>
+        <p:spPr>
+          <a:xfrm>
+            <a:off x="111833" y="171039"/>
+            <a:ext cx="266697" cy="6479732"/>
+          </a:xfrm>
+          <a:prstGeom prst="rect">
+            <a:avLst/>
+          </a:prstGeom>
+          <a:ln>
+            <a:noFill/>
+          </a:ln>
+        </p:spPr>
+        <p:style>
+          <a:lnRef idx="2">
+            <a:schemeClr val="accent1">
+              <a:shade val="15000"/>
+            </a:schemeClr>
+          </a:lnRef>
+          <a:fillRef idx="1">
+            <a:schemeClr val="accent1"/>
+          </a:fillRef>
+          <a:effectRef idx="0">
+            <a:schemeClr val="accent1"/>
+          </a:effectRef>
+          <a:fontRef idx="minor">
+            <a:schemeClr val="lt1"/>
+          </a:fontRef>
+        </p:style>
+        <p:txBody>
+          <a:bodyPr rtlCol="0" anchor="ctr"/>
+          <a:lstStyle/>
+          <a:p>
+            <a:pPr algn="ctr"/>
+            <a:endParaRPr lang="en-US"/>
+          </a:p>
+        </p:txBody>
+      </p:sp>
+      <p:sp>
+        <p:nvSpPr>
+          <p:cNvPr id="3" name="Rectangle 2">
+            <a:extLst>
+              <a:ext uri="{FF2B5EF4-FFF2-40B4-BE49-F238E27FC236}">
+                <a16:creationId xmlns:a16="http://schemas.microsoft.com/office/drawing/2014/main" id="{33EBD766-27E8-8A31-E25F-459934D5D1AA}"/>
+              </a:ext>
+            </a:extLst>
+          </p:cNvPr>
+          <p:cNvSpPr/>
+          <p:nvPr/>
+        </p:nvSpPr>
+        <p:spPr>
+          <a:xfrm>
+            <a:off x="111833" y="6447755"/>
+            <a:ext cx="2292347" cy="300771"/>
+          </a:xfrm>
+          <a:prstGeom prst="rect">
+            <a:avLst/>
+          </a:prstGeom>
+          <a:ln>
+            <a:noFill/>
+          </a:ln>
+        </p:spPr>
+        <p:style>
+          <a:lnRef idx="2">
+            <a:schemeClr val="accent1">
+              <a:shade val="15000"/>
+            </a:schemeClr>
+          </a:lnRef>
+          <a:fillRef idx="1">
+            <a:schemeClr val="accent1"/>
+          </a:fillRef>
+          <a:effectRef idx="0">
+            <a:schemeClr val="accent1"/>
+          </a:effectRef>
+          <a:fontRef idx="minor">
+            <a:schemeClr val="lt1"/>
+          </a:fontRef>
+        </p:style>
+        <p:txBody>
+          <a:bodyPr rtlCol="0" anchor="ctr"/>
+          <a:lstStyle/>
+          <a:p>
+            <a:pPr algn="ctr"/>
+            <a:endParaRPr lang="en-US"/>
+          </a:p>
+        </p:txBody>
+      </p:sp>
+      <p:sp>
+        <p:nvSpPr>
+          <p:cNvPr id="7" name="Inhaltsplatzhalter 6">
+            <a:extLst>
+              <a:ext uri="{FF2B5EF4-FFF2-40B4-BE49-F238E27FC236}">
+                <a16:creationId xmlns:a16="http://schemas.microsoft.com/office/drawing/2014/main" id="{175BDCAC-46D6-978F-ED36-D12EA18D507A}"/>
+              </a:ext>
+            </a:extLst>
+          </p:cNvPr>
+          <p:cNvSpPr>
+            <a:spLocks noGrp="1"/>
+          </p:cNvSpPr>
+          <p:nvPr>
+            <p:ph sz="half" idx="2"/>
+          </p:nvPr>
+        </p:nvSpPr>
+        <p:spPr>
+          <a:xfrm>
+            <a:off x="1704849" y="5956964"/>
+            <a:ext cx="8782300" cy="487362"/>
+          </a:xfrm>
+        </p:spPr>
+        <p:txBody>
+          <a:bodyPr>
+            <a:normAutofit/>
+          </a:bodyPr>
+          <a:lstStyle/>
+          <a:p>
+            <a:pPr marL="0" indent="0">
+              <a:buNone/>
+            </a:pPr>
+            <a:r>
+              <a:rPr lang="de-DE" dirty="0">
+                <a:hlinkClick r:id="rId2"/>
+              </a:rPr>
+              <a:t>https://github.com/lgndluke/RaytRazor/releases/latest/</a:t>
+            </a:r>
+            <a:r>
+              <a:rPr lang="de-DE" dirty="0"/>
+              <a:t> </a:t>
+            </a:r>
+          </a:p>
+        </p:txBody>
+      </p:sp>
+      <p:pic>
+        <p:nvPicPr>
+          <p:cNvPr id="8" name="Grafik 7">
+            <a:extLst>
+              <a:ext uri="{FF2B5EF4-FFF2-40B4-BE49-F238E27FC236}">
+                <a16:creationId xmlns:a16="http://schemas.microsoft.com/office/drawing/2014/main" id="{06BC7BB5-BB68-08B0-3EDB-E81A9031ACC5}"/>
+              </a:ext>
+            </a:extLst>
+          </p:cNvPr>
+          <p:cNvPicPr>
+            <a:picLocks noChangeAspect="1"/>
+          </p:cNvPicPr>
+          <p:nvPr/>
+        </p:nvPicPr>
+        <p:blipFill>
+          <a:blip r:embed="rId3">
+            <a:extLst>
+              <a:ext uri="{28A0092B-C50C-407E-A947-70E740481C1C}">
+                <a14:useLocalDpi xmlns:a14="http://schemas.microsoft.com/office/drawing/2010/main" val="0"/>
+              </a:ext>
+            </a:extLst>
+          </a:blip>
+          <a:srcRect/>
+          <a:stretch/>
+        </p:blipFill>
+        <p:spPr>
+          <a:xfrm>
+            <a:off x="2098704" y="1460784"/>
+            <a:ext cx="7994590" cy="4340159"/>
+          </a:xfrm>
+          <a:prstGeom prst="rect">
+            <a:avLst/>
+          </a:prstGeom>
+        </p:spPr>
+      </p:pic>
+    </p:spTree>
+    <p:extLst>
+      <p:ext uri="{BB962C8B-B14F-4D97-AF65-F5344CB8AC3E}">
+        <p14:creationId xmlns:p14="http://schemas.microsoft.com/office/powerpoint/2010/main" val="4018529521"/>
+      </p:ext>
+    </p:extLst>
+  </p:cSld>
+  <p:clrMapOvr>
+    <a:masterClrMapping/>
+  </p:clrMapOvr>
+</p:sld>
+</file>
+
+<file path=ppt/slides/slide3.xml><?xml version="1.0" encoding="utf-8"?>
+<p:sld xmlns:a="http://schemas.openxmlformats.org/drawingml/2006/main" xmlns:r="http://schemas.openxmlformats.org/officeDocument/2006/relationships" xmlns:p="http://schemas.openxmlformats.org/presentationml/2006/main">
+  <p:cSld>
+    <p:spTree>
+      <p:nvGrpSpPr>
+        <p:cNvPr id="1" name="">
+          <a:extLst>
+            <a:ext uri="{FF2B5EF4-FFF2-40B4-BE49-F238E27FC236}">
+              <a16:creationId xmlns:a16="http://schemas.microsoft.com/office/drawing/2014/main" id="{4396BE0F-BF53-24EF-EC9A-2578C88EACDF}"/>
+            </a:ext>
+          </a:extLst>
+        </p:cNvPr>
+        <p:cNvGrpSpPr/>
+        <p:nvPr/>
+      </p:nvGrpSpPr>
+      <p:grpSpPr>
+        <a:xfrm>
+          <a:off x="0" y="0"/>
+          <a:ext cx="0" cy="0"/>
+          <a:chOff x="0" y="0"/>
+          <a:chExt cx="0" cy="0"/>
+        </a:xfrm>
+      </p:grpSpPr>
+      <p:pic>
+        <p:nvPicPr>
+          <p:cNvPr id="5" name="Picture 4">
+            <a:extLst>
+              <a:ext uri="{FF2B5EF4-FFF2-40B4-BE49-F238E27FC236}">
+                <a16:creationId xmlns:a16="http://schemas.microsoft.com/office/drawing/2014/main" id="{AB0D0885-1280-9494-0744-A0ADC1BBC04A}"/>
+              </a:ext>
+            </a:extLst>
+          </p:cNvPr>
+          <p:cNvPicPr>
+            <a:picLocks noChangeAspect="1"/>
+          </p:cNvPicPr>
+          <p:nvPr/>
+        </p:nvPicPr>
+        <p:blipFill>
+          <a:blip r:embed="rId2">
+            <a:extLst>
+              <a:ext uri="{28A0092B-C50C-407E-A947-70E740481C1C}">
+                <a14:useLocalDpi xmlns:a14="http://schemas.microsoft.com/office/drawing/2010/main" val="0"/>
+              </a:ext>
+            </a:extLst>
+          </a:blip>
+          <a:srcRect l="5406" r="5406"/>
+          <a:stretch/>
+        </p:blipFill>
+        <p:spPr>
+          <a:xfrm>
+            <a:off x="6253078" y="666728"/>
+            <a:ext cx="4874829" cy="5465791"/>
+          </a:xfrm>
+          <a:prstGeom prst="rect">
+            <a:avLst/>
+          </a:prstGeom>
+        </p:spPr>
+      </p:pic>
+      <p:sp>
+        <p:nvSpPr>
+          <p:cNvPr id="16" name="Textfeld 15">
+            <a:extLst>
+              <a:ext uri="{FF2B5EF4-FFF2-40B4-BE49-F238E27FC236}">
+                <a16:creationId xmlns:a16="http://schemas.microsoft.com/office/drawing/2014/main" id="{60A235CB-7DDE-1592-B891-93A024E5D54A}"/>
+              </a:ext>
+            </a:extLst>
+          </p:cNvPr>
+          <p:cNvSpPr txBox="1"/>
+          <p:nvPr/>
+        </p:nvSpPr>
+        <p:spPr>
+          <a:xfrm>
+            <a:off x="378530" y="552970"/>
+            <a:ext cx="5031907" cy="689404"/>
+          </a:xfrm>
+          <a:prstGeom prst="rect">
+            <a:avLst/>
+          </a:prstGeom>
+          <a:noFill/>
+        </p:spPr>
+        <p:txBody>
+          <a:bodyPr wrap="square" rtlCol="0">
+            <a:spAutoFit/>
+          </a:bodyPr>
+          <a:lstStyle/>
+          <a:p>
+            <a:r>
+              <a:rPr lang="en-US" sz="4000" b="1" u="sng" dirty="0"/>
+              <a:t>Projekt: RaytRazor</a:t>
+            </a:r>
+            <a:endParaRPr lang="de-DE" sz="4000" u="sng" dirty="0"/>
+          </a:p>
+        </p:txBody>
+      </p:sp>
+      <p:sp>
+        <p:nvSpPr>
+          <p:cNvPr id="2" name="Rectangle 1">
+            <a:extLst>
+              <a:ext uri="{FF2B5EF4-FFF2-40B4-BE49-F238E27FC236}">
+                <a16:creationId xmlns:a16="http://schemas.microsoft.com/office/drawing/2014/main" id="{67000928-FDF3-8511-FABF-B0E60436EBEA}"/>
+              </a:ext>
+            </a:extLst>
+          </p:cNvPr>
+          <p:cNvSpPr/>
+          <p:nvPr/>
+        </p:nvSpPr>
+        <p:spPr>
+          <a:xfrm>
+            <a:off x="111833" y="171039"/>
+            <a:ext cx="266697" cy="6479732"/>
+          </a:xfrm>
+          <a:prstGeom prst="rect">
+            <a:avLst/>
+          </a:prstGeom>
+          <a:ln>
+            <a:noFill/>
+          </a:ln>
+        </p:spPr>
+        <p:style>
+          <a:lnRef idx="2">
+            <a:schemeClr val="accent1">
+              <a:shade val="15000"/>
+            </a:schemeClr>
+          </a:lnRef>
+          <a:fillRef idx="1">
+            <a:schemeClr val="accent1"/>
+          </a:fillRef>
+          <a:effectRef idx="0">
+            <a:schemeClr val="accent1"/>
+          </a:effectRef>
+          <a:fontRef idx="minor">
+            <a:schemeClr val="lt1"/>
+          </a:fontRef>
+        </p:style>
+        <p:txBody>
+          <a:bodyPr rtlCol="0" anchor="ctr"/>
+          <a:lstStyle/>
+          <a:p>
+            <a:pPr algn="ctr"/>
+            <a:endParaRPr lang="en-US"/>
+          </a:p>
+        </p:txBody>
+      </p:sp>
+      <p:sp>
+        <p:nvSpPr>
+          <p:cNvPr id="3" name="Rectangle 2">
+            <a:extLst>
+              <a:ext uri="{FF2B5EF4-FFF2-40B4-BE49-F238E27FC236}">
+                <a16:creationId xmlns:a16="http://schemas.microsoft.com/office/drawing/2014/main" id="{C4B0CAD5-60B7-CBF1-6496-D4475546C367}"/>
+              </a:ext>
+            </a:extLst>
+          </p:cNvPr>
+          <p:cNvSpPr/>
+          <p:nvPr/>
+        </p:nvSpPr>
+        <p:spPr>
+          <a:xfrm>
+            <a:off x="111833" y="6447755"/>
+            <a:ext cx="2292347" cy="300771"/>
+          </a:xfrm>
+          <a:prstGeom prst="rect">
+            <a:avLst/>
+          </a:prstGeom>
+          <a:ln>
+            <a:noFill/>
+          </a:ln>
+        </p:spPr>
+        <p:style>
+          <a:lnRef idx="2">
+            <a:schemeClr val="accent1">
+              <a:shade val="15000"/>
+            </a:schemeClr>
+          </a:lnRef>
+          <a:fillRef idx="1">
+            <a:schemeClr val="accent1"/>
+          </a:fillRef>
+          <a:effectRef idx="0">
+            <a:schemeClr val="accent1"/>
+          </a:effectRef>
+          <a:fontRef idx="minor">
+            <a:schemeClr val="lt1"/>
+          </a:fontRef>
+        </p:style>
+        <p:txBody>
+          <a:bodyPr rtlCol="0" anchor="ctr"/>
+          <a:lstStyle/>
+          <a:p>
+            <a:pPr algn="ctr"/>
+            <a:endParaRPr lang="en-US"/>
+          </a:p>
+        </p:txBody>
+      </p:sp>
+      <p:grpSp>
+        <p:nvGrpSpPr>
+          <p:cNvPr id="30" name="Gruppieren 29">
+            <a:extLst>
+              <a:ext uri="{FF2B5EF4-FFF2-40B4-BE49-F238E27FC236}">
+                <a16:creationId xmlns:a16="http://schemas.microsoft.com/office/drawing/2014/main" id="{CE34582B-2C39-9F55-029A-A917B7D9BDF8}"/>
+              </a:ext>
+            </a:extLst>
+          </p:cNvPr>
+          <p:cNvGrpSpPr/>
+          <p:nvPr/>
+        </p:nvGrpSpPr>
+        <p:grpSpPr>
+          <a:xfrm>
+            <a:off x="519216" y="1614207"/>
+            <a:ext cx="5576784" cy="4646915"/>
+            <a:chOff x="378530" y="1439147"/>
+            <a:chExt cx="5874548" cy="4893299"/>
+          </a:xfrm>
+        </p:grpSpPr>
+        <p:grpSp>
+          <p:nvGrpSpPr>
+            <p:cNvPr id="12" name="Group 6">
+              <a:extLst>
+                <a:ext uri="{FF2B5EF4-FFF2-40B4-BE49-F238E27FC236}">
+                  <a16:creationId xmlns:a16="http://schemas.microsoft.com/office/drawing/2014/main" id="{9A3ED264-D177-193E-4499-C1F7B5DBA7E3}"/>
+                </a:ext>
+              </a:extLst>
+            </p:cNvPr>
+            <p:cNvGrpSpPr/>
+            <p:nvPr/>
+          </p:nvGrpSpPr>
+          <p:grpSpPr>
+            <a:xfrm>
+              <a:off x="485415" y="1625989"/>
+              <a:ext cx="1617751" cy="1861453"/>
+              <a:chOff x="9010776" y="3606801"/>
+              <a:chExt cx="2411821" cy="2775144"/>
+            </a:xfrm>
+          </p:grpSpPr>
+          <p:pic>
+            <p:nvPicPr>
+              <p:cNvPr id="13" name="Picture 10" descr="A black background with a black square&#10;&#10;Description automatically generated with medium confidence">
+                <a:extLst>
+                  <a:ext uri="{FF2B5EF4-FFF2-40B4-BE49-F238E27FC236}">
+                    <a16:creationId xmlns:a16="http://schemas.microsoft.com/office/drawing/2014/main" id="{A7B96528-1A80-A258-87A7-7381724A9566}"/>
+                  </a:ext>
+                </a:extLst>
+              </p:cNvPr>
+              <p:cNvPicPr>
+                <a:picLocks noChangeAspect="1" noChangeArrowheads="1"/>
+              </p:cNvPicPr>
+              <p:nvPr/>
+            </p:nvPicPr>
+            <p:blipFill>
+              <a:blip r:embed="rId3">
+                <a:extLst>
+                  <a:ext uri="{28A0092B-C50C-407E-A947-70E740481C1C}">
+                    <a14:useLocalDpi xmlns:a14="http://schemas.microsoft.com/office/drawing/2010/main" val="0"/>
+                  </a:ext>
+                </a:extLst>
+              </a:blip>
+              <a:stretch>
+                <a:fillRect/>
+              </a:stretch>
+            </p:blipFill>
+            <p:spPr bwMode="auto">
+              <a:xfrm>
+                <a:off x="9207547" y="3606801"/>
+                <a:ext cx="2015943" cy="2015942"/>
+              </a:xfrm>
+              <a:prstGeom prst="rect">
+                <a:avLst/>
+              </a:prstGeom>
+              <a:noFill/>
+              <a:extLst>
+                <a:ext uri="{909E8E84-426E-40DD-AFC4-6F175D3DCCD1}">
+                  <a14:hiddenFill xmlns:a14="http://schemas.microsoft.com/office/drawing/2010/main">
+                    <a:solidFill>
+                      <a:srgbClr val="FFFFFF"/>
+                    </a:solidFill>
+                  </a14:hiddenFill>
+                </a:ext>
+              </a:extLst>
+            </p:spPr>
+          </p:pic>
+          <p:sp>
+            <p:nvSpPr>
+              <p:cNvPr id="14" name="TextBox 5">
+                <a:extLst>
+                  <a:ext uri="{FF2B5EF4-FFF2-40B4-BE49-F238E27FC236}">
+                    <a16:creationId xmlns:a16="http://schemas.microsoft.com/office/drawing/2014/main" id="{A49E98E5-B555-56DA-6607-E895CE51F97B}"/>
+                  </a:ext>
+                </a:extLst>
+              </p:cNvPr>
+              <p:cNvSpPr txBox="1"/>
+              <p:nvPr/>
+            </p:nvSpPr>
+            <p:spPr>
+              <a:xfrm>
+                <a:off x="9010776" y="5601902"/>
+                <a:ext cx="2411821" cy="780043"/>
+              </a:xfrm>
+              <a:prstGeom prst="rect">
+                <a:avLst/>
+              </a:prstGeom>
+              <a:noFill/>
+            </p:spPr>
+            <p:txBody>
+              <a:bodyPr wrap="none" rtlCol="0">
+                <a:spAutoFit/>
+              </a:bodyPr>
+              <a:lstStyle/>
+              <a:p>
+                <a:pPr defTabSz="687709">
+                  <a:spcAft>
+                    <a:spcPts val="765"/>
+                  </a:spcAft>
+                </a:pPr>
+                <a:r>
+                  <a:rPr lang="de-DE" sz="2800" kern="1200" dirty="0" err="1">
+                    <a:solidFill>
+                      <a:schemeClr val="tx1"/>
+                    </a:solidFill>
+                    <a:latin typeface="+mn-lt"/>
+                    <a:ea typeface="+mn-ea"/>
+                    <a:cs typeface="+mn-cs"/>
+                  </a:rPr>
+                  <a:t>NanoGUI</a:t>
+                </a:r>
+                <a:endParaRPr lang="en-US" sz="900" dirty="0"/>
+              </a:p>
+            </p:txBody>
+          </p:sp>
+        </p:grpSp>
+        <p:pic>
+          <p:nvPicPr>
+            <p:cNvPr id="15" name="Picture 8">
+              <a:extLst>
+                <a:ext uri="{FF2B5EF4-FFF2-40B4-BE49-F238E27FC236}">
+                  <a16:creationId xmlns:a16="http://schemas.microsoft.com/office/drawing/2014/main" id="{9EE827B1-1525-11BC-DFA3-17A9CB4CE884}"/>
+                </a:ext>
+              </a:extLst>
+            </p:cNvPr>
+            <p:cNvPicPr>
+              <a:picLocks noChangeAspect="1" noChangeArrowheads="1"/>
+            </p:cNvPicPr>
+            <p:nvPr/>
+          </p:nvPicPr>
+          <p:blipFill>
+            <a:blip r:embed="rId4">
+              <a:extLst>
+                <a:ext uri="{28A0092B-C50C-407E-A947-70E740481C1C}">
+                  <a14:useLocalDpi xmlns:a14="http://schemas.microsoft.com/office/drawing/2010/main" val="0"/>
+                </a:ext>
+              </a:extLst>
+            </a:blip>
+            <a:stretch>
+              <a:fillRect/>
+            </a:stretch>
+          </p:blipFill>
+          <p:spPr bwMode="auto">
+            <a:xfrm>
+              <a:off x="2486349" y="3598658"/>
+              <a:ext cx="2228365" cy="930342"/>
+            </a:xfrm>
+            <a:prstGeom prst="rect">
+              <a:avLst/>
+            </a:prstGeom>
+            <a:noFill/>
+            <a:extLst>
+              <a:ext uri="{909E8E84-426E-40DD-AFC4-6F175D3DCCD1}">
+                <a14:hiddenFill xmlns:a14="http://schemas.microsoft.com/office/drawing/2010/main">
+                  <a:solidFill>
+                    <a:srgbClr val="FFFFFF"/>
+                  </a:solidFill>
+                </a14:hiddenFill>
+              </a:ext>
+            </a:extLst>
+          </p:spPr>
+        </p:pic>
+        <p:pic>
+          <p:nvPicPr>
+            <p:cNvPr id="17" name="Picture 8" descr="A blue hexagon with white letters and white crosses&#10;&#10;Description automatically generated">
+              <a:extLst>
+                <a:ext uri="{FF2B5EF4-FFF2-40B4-BE49-F238E27FC236}">
+                  <a16:creationId xmlns:a16="http://schemas.microsoft.com/office/drawing/2014/main" id="{38E10656-A15F-EE9F-6289-1AACF26B7FBA}"/>
+                </a:ext>
+              </a:extLst>
+            </p:cNvPr>
+            <p:cNvPicPr>
+              <a:picLocks noChangeAspect="1"/>
+            </p:cNvPicPr>
+            <p:nvPr/>
+          </p:nvPicPr>
+          <p:blipFill>
+            <a:blip r:embed="rId5">
+              <a:extLst>
+                <a:ext uri="{28A0092B-C50C-407E-A947-70E740481C1C}">
+                  <a14:useLocalDpi xmlns:a14="http://schemas.microsoft.com/office/drawing/2010/main" val="0"/>
+                </a:ext>
+              </a:extLst>
+            </a:blip>
+            <a:stretch>
+              <a:fillRect/>
+            </a:stretch>
+          </p:blipFill>
+          <p:spPr>
+            <a:xfrm>
+              <a:off x="4661995" y="1439147"/>
+              <a:ext cx="1509592" cy="1509592"/>
+            </a:xfrm>
+            <a:prstGeom prst="rect">
+              <a:avLst/>
+            </a:prstGeom>
+          </p:spPr>
+        </p:pic>
+        <p:pic>
+          <p:nvPicPr>
+            <p:cNvPr id="18" name="Picture 4" descr="Microsoft Teams Logo - PNG and Vector - Logo Download">
+              <a:extLst>
+                <a:ext uri="{FF2B5EF4-FFF2-40B4-BE49-F238E27FC236}">
+                  <a16:creationId xmlns:a16="http://schemas.microsoft.com/office/drawing/2014/main" id="{EEDE9860-5A9F-43F2-E3A2-2E551CDED9C5}"/>
+                </a:ext>
+              </a:extLst>
+            </p:cNvPr>
+            <p:cNvPicPr>
+              <a:picLocks noChangeAspect="1" noChangeArrowheads="1"/>
+            </p:cNvPicPr>
+            <p:nvPr/>
+          </p:nvPicPr>
+          <p:blipFill>
+            <a:blip r:embed="rId6">
+              <a:extLst>
+                <a:ext uri="{28A0092B-C50C-407E-A947-70E740481C1C}">
+                  <a14:useLocalDpi xmlns:a14="http://schemas.microsoft.com/office/drawing/2010/main" val="0"/>
+                </a:ext>
+              </a:extLst>
+            </a:blip>
+            <a:stretch>
+              <a:fillRect/>
+            </a:stretch>
+          </p:blipFill>
+          <p:spPr bwMode="auto">
+            <a:xfrm>
+              <a:off x="4624829" y="3059748"/>
+              <a:ext cx="1628249" cy="1640591"/>
+            </a:xfrm>
+            <a:prstGeom prst="rect">
+              <a:avLst/>
+            </a:prstGeom>
+            <a:noFill/>
+            <a:extLst>
+              <a:ext uri="{909E8E84-426E-40DD-AFC4-6F175D3DCCD1}">
+                <a14:hiddenFill xmlns:a14="http://schemas.microsoft.com/office/drawing/2010/main">
+                  <a:solidFill>
+                    <a:srgbClr val="FFFFFF"/>
+                  </a:solidFill>
+                </a14:hiddenFill>
+              </a:ext>
+            </a:extLst>
+          </p:spPr>
+        </p:pic>
+        <p:pic>
+          <p:nvPicPr>
+            <p:cNvPr id="19" name="Picture 6" descr="Discord logo Icons, Logos, Symbole – Kostenloser Download ...">
+              <a:extLst>
+                <a:ext uri="{FF2B5EF4-FFF2-40B4-BE49-F238E27FC236}">
+                  <a16:creationId xmlns:a16="http://schemas.microsoft.com/office/drawing/2014/main" id="{D63D83F3-1C6B-FF7A-6D87-8B79EBDFD06C}"/>
+                </a:ext>
+              </a:extLst>
+            </p:cNvPr>
+            <p:cNvPicPr>
+              <a:picLocks noChangeAspect="1" noChangeArrowheads="1"/>
+            </p:cNvPicPr>
+            <p:nvPr/>
+          </p:nvPicPr>
+          <p:blipFill>
+            <a:blip r:embed="rId7">
+              <a:extLst>
+                <a:ext uri="{28A0092B-C50C-407E-A947-70E740481C1C}">
+                  <a14:useLocalDpi xmlns:a14="http://schemas.microsoft.com/office/drawing/2010/main" val="0"/>
+                </a:ext>
+              </a:extLst>
+            </a:blip>
+            <a:stretch>
+              <a:fillRect/>
+            </a:stretch>
+          </p:blipFill>
+          <p:spPr bwMode="auto">
+            <a:xfrm>
+              <a:off x="2635668" y="1750997"/>
+              <a:ext cx="1509591" cy="1509591"/>
+            </a:xfrm>
+            <a:prstGeom prst="rect">
+              <a:avLst/>
+            </a:prstGeom>
+            <a:noFill/>
+            <a:extLst>
+              <a:ext uri="{909E8E84-426E-40DD-AFC4-6F175D3DCCD1}">
+                <a14:hiddenFill xmlns:a14="http://schemas.microsoft.com/office/drawing/2010/main">
+                  <a:solidFill>
+                    <a:srgbClr val="FFFFFF"/>
+                  </a:solidFill>
+                </a14:hiddenFill>
+              </a:ext>
+            </a:extLst>
+          </p:spPr>
+        </p:pic>
+        <p:pic>
+          <p:nvPicPr>
+            <p:cNvPr id="23" name="Picture 10" descr="A black background with a black square&#10;&#10;Description automatically generated with medium confidence">
+              <a:extLst>
+                <a:ext uri="{FF2B5EF4-FFF2-40B4-BE49-F238E27FC236}">
+                  <a16:creationId xmlns:a16="http://schemas.microsoft.com/office/drawing/2014/main" id="{9C70FFA8-DFAE-C735-5624-19A5B9BB456D}"/>
+                </a:ext>
+              </a:extLst>
+            </p:cNvPr>
+            <p:cNvPicPr>
+              <a:picLocks noChangeAspect="1" noChangeArrowheads="1"/>
+            </p:cNvPicPr>
+            <p:nvPr/>
+          </p:nvPicPr>
+          <p:blipFill>
+            <a:blip r:embed="rId3">
+              <a:extLst>
+                <a:ext uri="{28A0092B-C50C-407E-A947-70E740481C1C}">
+                  <a14:useLocalDpi xmlns:a14="http://schemas.microsoft.com/office/drawing/2010/main" val="0"/>
+                </a:ext>
+              </a:extLst>
+            </a:blip>
+            <a:stretch>
+              <a:fillRect/>
+            </a:stretch>
+          </p:blipFill>
+          <p:spPr bwMode="auto">
+            <a:xfrm>
+              <a:off x="485416" y="5175092"/>
+              <a:ext cx="1157354" cy="1157354"/>
+            </a:xfrm>
+            <a:prstGeom prst="rect">
+              <a:avLst/>
+            </a:prstGeom>
+            <a:noFill/>
+            <a:extLst>
+              <a:ext uri="{909E8E84-426E-40DD-AFC4-6F175D3DCCD1}">
+                <a14:hiddenFill xmlns:a14="http://schemas.microsoft.com/office/drawing/2010/main">
+                  <a:solidFill>
+                    <a:srgbClr val="FFFFFF"/>
+                  </a:solidFill>
+                </a14:hiddenFill>
+              </a:ext>
+            </a:extLst>
+          </p:spPr>
+        </p:pic>
+        <p:pic>
+          <p:nvPicPr>
+            <p:cNvPr id="25" name="Grafik 24" descr="Ein Bild, das Schrift, Grafiken, Logo, Text enthält.&#10;&#10;Automatisch generierte Beschreibung">
+              <a:extLst>
+                <a:ext uri="{FF2B5EF4-FFF2-40B4-BE49-F238E27FC236}">
+                  <a16:creationId xmlns:a16="http://schemas.microsoft.com/office/drawing/2014/main" id="{90AEA371-F313-8180-4DD3-CA9B0569F46B}"/>
+                </a:ext>
+              </a:extLst>
+            </p:cNvPr>
+            <p:cNvPicPr>
+              <a:picLocks noChangeAspect="1"/>
+            </p:cNvPicPr>
+            <p:nvPr/>
+          </p:nvPicPr>
+          <p:blipFill>
+            <a:blip r:embed="rId8">
+              <a:extLst>
+                <a:ext uri="{28A0092B-C50C-407E-A947-70E740481C1C}">
+                  <a14:useLocalDpi xmlns:a14="http://schemas.microsoft.com/office/drawing/2010/main" val="0"/>
+                </a:ext>
+              </a:extLst>
+            </a:blip>
+            <a:srcRect l="24219" t="2010" r="21447" b="5678"/>
+            <a:stretch/>
+          </p:blipFill>
+          <p:spPr>
+            <a:xfrm>
+              <a:off x="4189965" y="4617305"/>
+              <a:ext cx="1987747" cy="1654825"/>
+            </a:xfrm>
+            <a:prstGeom prst="rect">
+              <a:avLst/>
+            </a:prstGeom>
+          </p:spPr>
+        </p:pic>
+        <p:pic>
+          <p:nvPicPr>
+            <p:cNvPr id="27" name="Grafik 26" descr="Ein Bild, das Text, Logo, Schrift, Grafiken enthält.&#10;&#10;Automatisch generierte Beschreibung">
+              <a:extLst>
+                <a:ext uri="{FF2B5EF4-FFF2-40B4-BE49-F238E27FC236}">
+                  <a16:creationId xmlns:a16="http://schemas.microsoft.com/office/drawing/2014/main" id="{48029628-B097-0C88-EC82-98986CBF49D6}"/>
+                </a:ext>
+              </a:extLst>
+            </p:cNvPr>
+            <p:cNvPicPr>
+              <a:picLocks noChangeAspect="1"/>
+            </p:cNvPicPr>
+            <p:nvPr/>
+          </p:nvPicPr>
+          <p:blipFill>
+            <a:blip r:embed="rId9">
+              <a:extLst>
+                <a:ext uri="{28A0092B-C50C-407E-A947-70E740481C1C}">
+                  <a14:useLocalDpi xmlns:a14="http://schemas.microsoft.com/office/drawing/2010/main" val="0"/>
+                </a:ext>
+              </a:extLst>
+            </a:blip>
+            <a:srcRect l="22277" t="11426" r="22601" b="7232"/>
+            <a:stretch/>
+          </p:blipFill>
+          <p:spPr>
+            <a:xfrm>
+              <a:off x="2148666" y="5115639"/>
+              <a:ext cx="1879585" cy="1075633"/>
+            </a:xfrm>
+            <a:prstGeom prst="rect">
+              <a:avLst/>
+            </a:prstGeom>
+          </p:spPr>
+        </p:pic>
+        <p:pic>
+          <p:nvPicPr>
+            <p:cNvPr id="29" name="Grafik 28" descr="Ein Bild, das Schrift, Logo, Grafiken, Marke enthält.&#10;&#10;Automatisch generierte Beschreibung">
+              <a:extLst>
+                <a:ext uri="{FF2B5EF4-FFF2-40B4-BE49-F238E27FC236}">
+                  <a16:creationId xmlns:a16="http://schemas.microsoft.com/office/drawing/2014/main" id="{00B97798-315C-399A-C352-E754F1BEED7A}"/>
+                </a:ext>
+              </a:extLst>
+            </p:cNvPr>
+            <p:cNvPicPr>
+              <a:picLocks noChangeAspect="1"/>
+            </p:cNvPicPr>
+            <p:nvPr/>
+          </p:nvPicPr>
+          <p:blipFill>
+            <a:blip r:embed="rId10">
+              <a:extLst>
+                <a:ext uri="{28A0092B-C50C-407E-A947-70E740481C1C}">
+                  <a14:useLocalDpi xmlns:a14="http://schemas.microsoft.com/office/drawing/2010/main" val="0"/>
+                </a:ext>
+              </a:extLst>
+            </a:blip>
+            <a:stretch>
+              <a:fillRect/>
+            </a:stretch>
+          </p:blipFill>
+          <p:spPr>
+            <a:xfrm>
+              <a:off x="378530" y="4079407"/>
+              <a:ext cx="1949978" cy="605409"/>
+            </a:xfrm>
+            <a:prstGeom prst="rect">
+              <a:avLst/>
+            </a:prstGeom>
+          </p:spPr>
+        </p:pic>
+      </p:grpSp>
+    </p:spTree>
+    <p:extLst>
+      <p:ext uri="{BB962C8B-B14F-4D97-AF65-F5344CB8AC3E}">
+        <p14:creationId xmlns:p14="http://schemas.microsoft.com/office/powerpoint/2010/main" val="3784528720"/>
+      </p:ext>
+    </p:extLst>
+  </p:cSld>
+  <p:clrMapOvr>
+    <a:masterClrMapping/>
+  </p:clrMapOvr>
+</p:sld>
+</file>
+
+<file path=ppt/slides/slide4.xml><?xml version="1.0" encoding="utf-8"?>
+<p:sld xmlns:a="http://schemas.openxmlformats.org/drawingml/2006/main" xmlns:r="http://schemas.openxmlformats.org/officeDocument/2006/relationships" xmlns:p="http://schemas.openxmlformats.org/presentationml/2006/main">
+  <p:cSld>
+    <p:spTree>
+      <p:nvGrpSpPr>
+        <p:cNvPr id="1" name="">
+          <a:extLst>
+            <a:ext uri="{FF2B5EF4-FFF2-40B4-BE49-F238E27FC236}">
+              <a16:creationId xmlns:a16="http://schemas.microsoft.com/office/drawing/2014/main" id="{53E69AB5-1159-D5C0-B57B-598D9832BFAE}"/>
+            </a:ext>
+          </a:extLst>
+        </p:cNvPr>
+        <p:cNvGrpSpPr/>
+        <p:nvPr/>
+      </p:nvGrpSpPr>
+      <p:grpSpPr>
+        <a:xfrm>
+          <a:off x="0" y="0"/>
+          <a:ext cx="0" cy="0"/>
+          <a:chOff x="0" y="0"/>
+          <a:chExt cx="0" cy="0"/>
+        </a:xfrm>
+      </p:grpSpPr>
+      <p:sp>
+        <p:nvSpPr>
+          <p:cNvPr id="16" name="Textfeld 15">
+            <a:extLst>
+              <a:ext uri="{FF2B5EF4-FFF2-40B4-BE49-F238E27FC236}">
+                <a16:creationId xmlns:a16="http://schemas.microsoft.com/office/drawing/2014/main" id="{2C216DE8-44FA-1A8D-0415-F106B095E6B9}"/>
+              </a:ext>
+            </a:extLst>
+          </p:cNvPr>
+          <p:cNvSpPr txBox="1"/>
+          <p:nvPr/>
+        </p:nvSpPr>
+        <p:spPr>
+          <a:xfrm>
+            <a:off x="378530" y="554363"/>
+            <a:ext cx="5031907" cy="707886"/>
+          </a:xfrm>
+          <a:prstGeom prst="rect">
+            <a:avLst/>
+          </a:prstGeom>
+          <a:noFill/>
+        </p:spPr>
+        <p:txBody>
+          <a:bodyPr wrap="square" rtlCol="0">
+            <a:spAutoFit/>
+          </a:bodyPr>
+          <a:lstStyle/>
+          <a:p>
+            <a:r>
+              <a:rPr lang="de-DE" sz="4000" b="1" u="sng" dirty="0"/>
+              <a:t>Einblick Architektur:</a:t>
+            </a:r>
+            <a:endParaRPr lang="de-DE" sz="4000" u="sng" dirty="0"/>
+          </a:p>
+        </p:txBody>
+      </p:sp>
+      <p:sp>
+        <p:nvSpPr>
+          <p:cNvPr id="2" name="Rectangle 1">
+            <a:extLst>
+              <a:ext uri="{FF2B5EF4-FFF2-40B4-BE49-F238E27FC236}">
+                <a16:creationId xmlns:a16="http://schemas.microsoft.com/office/drawing/2014/main" id="{8F4D4D3B-E2BA-7AB5-9ECD-F2E9FFE95BA7}"/>
+              </a:ext>
+            </a:extLst>
+          </p:cNvPr>
+          <p:cNvSpPr/>
+          <p:nvPr/>
+        </p:nvSpPr>
+        <p:spPr>
+          <a:xfrm>
+            <a:off x="111833" y="171039"/>
+            <a:ext cx="266697" cy="6479732"/>
+          </a:xfrm>
+          <a:prstGeom prst="rect">
+            <a:avLst/>
+          </a:prstGeom>
+          <a:ln>
+            <a:noFill/>
+          </a:ln>
+        </p:spPr>
+        <p:style>
+          <a:lnRef idx="2">
+            <a:schemeClr val="accent1">
+              <a:shade val="15000"/>
+            </a:schemeClr>
+          </a:lnRef>
+          <a:fillRef idx="1">
+            <a:schemeClr val="accent1"/>
+          </a:fillRef>
+          <a:effectRef idx="0">
+            <a:schemeClr val="accent1"/>
+          </a:effectRef>
+          <a:fontRef idx="minor">
+            <a:schemeClr val="lt1"/>
+          </a:fontRef>
+        </p:style>
+        <p:txBody>
+          <a:bodyPr rtlCol="0" anchor="ctr"/>
+          <a:lstStyle/>
+          <a:p>
+            <a:pPr algn="ctr"/>
+            <a:endParaRPr lang="en-US"/>
+          </a:p>
+        </p:txBody>
+      </p:sp>
+      <p:sp>
+        <p:nvSpPr>
+          <p:cNvPr id="3" name="Rectangle 2">
+            <a:extLst>
+              <a:ext uri="{FF2B5EF4-FFF2-40B4-BE49-F238E27FC236}">
+                <a16:creationId xmlns:a16="http://schemas.microsoft.com/office/drawing/2014/main" id="{6C9AEC5A-FB9F-A999-5577-27B8B4DB6AB9}"/>
+              </a:ext>
+            </a:extLst>
+          </p:cNvPr>
+          <p:cNvSpPr/>
+          <p:nvPr/>
+        </p:nvSpPr>
+        <p:spPr>
+          <a:xfrm>
+            <a:off x="111833" y="6447755"/>
+            <a:ext cx="2292347" cy="300771"/>
+          </a:xfrm>
+          <a:prstGeom prst="rect">
+            <a:avLst/>
+          </a:prstGeom>
+          <a:ln>
+            <a:noFill/>
+          </a:ln>
+        </p:spPr>
+        <p:style>
+          <a:lnRef idx="2">
+            <a:schemeClr val="accent1">
+              <a:shade val="15000"/>
+            </a:schemeClr>
+          </a:lnRef>
+          <a:fillRef idx="1">
+            <a:schemeClr val="accent1"/>
+          </a:fillRef>
+          <a:effectRef idx="0">
+            <a:schemeClr val="accent1"/>
+          </a:effectRef>
+          <a:fontRef idx="minor">
+            <a:schemeClr val="lt1"/>
+          </a:fontRef>
+        </p:style>
+        <p:txBody>
+          <a:bodyPr rtlCol="0" anchor="ctr"/>
+          <a:lstStyle/>
+          <a:p>
+            <a:pPr algn="ctr"/>
+            <a:endParaRPr lang="en-US"/>
+          </a:p>
+        </p:txBody>
+      </p:sp>
+      <p:pic>
+        <p:nvPicPr>
+          <p:cNvPr id="4" name="Grafik 3" descr="Ein Bild, das Diagramm, Text, Screenshot, Plan enthält.&#10;&#10;Automatisch generierte Beschreibung">
+            <a:extLst>
+              <a:ext uri="{FF2B5EF4-FFF2-40B4-BE49-F238E27FC236}">
+                <a16:creationId xmlns:a16="http://schemas.microsoft.com/office/drawing/2014/main" id="{3D57B45B-B086-8011-BA1D-C1CB9D3C1A5B}"/>
+              </a:ext>
+            </a:extLst>
+          </p:cNvPr>
+          <p:cNvPicPr>
+            <a:picLocks noChangeAspect="1"/>
+          </p:cNvPicPr>
+          <p:nvPr/>
+        </p:nvPicPr>
+        <p:blipFill>
+          <a:blip r:embed="rId2">
+            <a:extLst>
+              <a:ext uri="{28A0092B-C50C-407E-A947-70E740481C1C}">
+                <a14:useLocalDpi xmlns:a14="http://schemas.microsoft.com/office/drawing/2010/main" val="0"/>
+              </a:ext>
+            </a:extLst>
+          </a:blip>
+          <a:stretch>
+            <a:fillRect/>
+          </a:stretch>
+        </p:blipFill>
+        <p:spPr>
+          <a:xfrm>
+            <a:off x="1378500" y="1278307"/>
+            <a:ext cx="9435000" cy="4834786"/>
+          </a:xfrm>
+          <a:prstGeom prst="rect">
+            <a:avLst/>
+          </a:prstGeom>
+        </p:spPr>
+      </p:pic>
+      <p:sp>
+        <p:nvSpPr>
+          <p:cNvPr id="5" name="Textfeld 4">
+            <a:extLst>
+              <a:ext uri="{FF2B5EF4-FFF2-40B4-BE49-F238E27FC236}">
+                <a16:creationId xmlns:a16="http://schemas.microsoft.com/office/drawing/2014/main" id="{19BE3AE4-8D6C-FD7E-5290-8593F72729C2}"/>
+              </a:ext>
+            </a:extLst>
+          </p:cNvPr>
+          <p:cNvSpPr txBox="1"/>
+          <p:nvPr/>
+        </p:nvSpPr>
+        <p:spPr>
+          <a:xfrm>
+            <a:off x="1302456" y="6095758"/>
+            <a:ext cx="3079855" cy="369332"/>
+          </a:xfrm>
+          <a:prstGeom prst="rect">
+            <a:avLst/>
+          </a:prstGeom>
+          <a:noFill/>
+        </p:spPr>
+        <p:txBody>
+          <a:bodyPr wrap="square" rtlCol="0">
+            <a:spAutoFit/>
+          </a:bodyPr>
+          <a:lstStyle/>
+          <a:p>
+            <a:r>
+              <a:rPr lang="de-DE" b="1" dirty="0"/>
+              <a:t>Stand: </a:t>
+            </a:r>
+            <a:r>
+              <a:rPr lang="de-DE" dirty="0"/>
+              <a:t>Ende Sprint Review #2</a:t>
+            </a:r>
+          </a:p>
+        </p:txBody>
+      </p:sp>
+    </p:spTree>
+    <p:extLst>
+      <p:ext uri="{BB962C8B-B14F-4D97-AF65-F5344CB8AC3E}">
+        <p14:creationId xmlns:p14="http://schemas.microsoft.com/office/powerpoint/2010/main" val="3045535258"/>
+      </p:ext>
+    </p:extLst>
+  </p:cSld>
+  <p:clrMapOvr>
+    <a:masterClrMapping/>
+  </p:clrMapOvr>
+</p:sld>
+</file>
+
+<file path=ppt/slides/slide5.xml><?xml version="1.0" encoding="utf-8"?>
+<p:sld xmlns:a="http://schemas.openxmlformats.org/drawingml/2006/main" xmlns:r="http://schemas.openxmlformats.org/officeDocument/2006/relationships" xmlns:p="http://schemas.openxmlformats.org/presentationml/2006/main">
+  <p:cSld>
+    <p:spTree>
+      <p:nvGrpSpPr>
+        <p:cNvPr id="1" name="">
+          <a:extLst>
+            <a:ext uri="{FF2B5EF4-FFF2-40B4-BE49-F238E27FC236}">
+              <a16:creationId xmlns:a16="http://schemas.microsoft.com/office/drawing/2014/main" id="{64182218-F6D5-3987-2378-BFF31B6B371B}"/>
+            </a:ext>
+          </a:extLst>
+        </p:cNvPr>
+        <p:cNvGrpSpPr/>
+        <p:nvPr/>
+      </p:nvGrpSpPr>
+      <p:grpSpPr>
+        <a:xfrm>
+          <a:off x="0" y="0"/>
+          <a:ext cx="0" cy="0"/>
+          <a:chOff x="0" y="0"/>
+          <a:chExt cx="0" cy="0"/>
+        </a:xfrm>
+      </p:grpSpPr>
+      <p:sp>
+        <p:nvSpPr>
+          <p:cNvPr id="16" name="Textfeld 15">
+            <a:extLst>
+              <a:ext uri="{FF2B5EF4-FFF2-40B4-BE49-F238E27FC236}">
+                <a16:creationId xmlns:a16="http://schemas.microsoft.com/office/drawing/2014/main" id="{E2F8C310-BDA6-CAC0-A8C2-2D6197182FE6}"/>
+              </a:ext>
+            </a:extLst>
+          </p:cNvPr>
+          <p:cNvSpPr txBox="1"/>
+          <p:nvPr/>
+        </p:nvSpPr>
+        <p:spPr>
+          <a:xfrm>
+            <a:off x="378530" y="550283"/>
+            <a:ext cx="5366000" cy="707886"/>
+          </a:xfrm>
+          <a:prstGeom prst="rect">
+            <a:avLst/>
+          </a:prstGeom>
+          <a:noFill/>
+        </p:spPr>
+        <p:txBody>
+          <a:bodyPr wrap="square" rtlCol="0">
+            <a:spAutoFit/>
+          </a:bodyPr>
+          <a:lstStyle/>
+          <a:p>
+            <a:r>
+              <a:rPr lang="de-DE" sz="4000" b="1" u="sng" dirty="0"/>
+              <a:t>Probleme / Lösungen:</a:t>
+            </a:r>
+            <a:endParaRPr lang="de-DE" sz="4000" u="sng" dirty="0"/>
+          </a:p>
+        </p:txBody>
+      </p:sp>
+      <p:sp>
+        <p:nvSpPr>
+          <p:cNvPr id="2" name="Rectangle 1">
+            <a:extLst>
+              <a:ext uri="{FF2B5EF4-FFF2-40B4-BE49-F238E27FC236}">
+                <a16:creationId xmlns:a16="http://schemas.microsoft.com/office/drawing/2014/main" id="{0E25613F-1921-4B7A-7234-B5BAB633D802}"/>
+              </a:ext>
+            </a:extLst>
+          </p:cNvPr>
+          <p:cNvSpPr/>
+          <p:nvPr/>
+        </p:nvSpPr>
+        <p:spPr>
+          <a:xfrm>
+            <a:off x="111833" y="171039"/>
+            <a:ext cx="266697" cy="6479732"/>
+          </a:xfrm>
+          <a:prstGeom prst="rect">
+            <a:avLst/>
+          </a:prstGeom>
+          <a:ln>
+            <a:noFill/>
+          </a:ln>
+        </p:spPr>
+        <p:style>
+          <a:lnRef idx="2">
+            <a:schemeClr val="accent1">
+              <a:shade val="15000"/>
+            </a:schemeClr>
+          </a:lnRef>
+          <a:fillRef idx="1">
+            <a:schemeClr val="accent1"/>
+          </a:fillRef>
+          <a:effectRef idx="0">
+            <a:schemeClr val="accent1"/>
+          </a:effectRef>
+          <a:fontRef idx="minor">
+            <a:schemeClr val="lt1"/>
+          </a:fontRef>
+        </p:style>
+        <p:txBody>
+          <a:bodyPr rtlCol="0" anchor="ctr"/>
+          <a:lstStyle/>
+          <a:p>
+            <a:pPr algn="ctr"/>
+            <a:endParaRPr lang="en-US"/>
+          </a:p>
+        </p:txBody>
+      </p:sp>
+      <p:sp>
+        <p:nvSpPr>
+          <p:cNvPr id="3" name="Rectangle 2">
+            <a:extLst>
+              <a:ext uri="{FF2B5EF4-FFF2-40B4-BE49-F238E27FC236}">
+                <a16:creationId xmlns:a16="http://schemas.microsoft.com/office/drawing/2014/main" id="{3F166E50-0A2B-9FC8-302A-281C741AD260}"/>
+              </a:ext>
+            </a:extLst>
+          </p:cNvPr>
+          <p:cNvSpPr/>
+          <p:nvPr/>
+        </p:nvSpPr>
+        <p:spPr>
+          <a:xfrm>
+            <a:off x="111833" y="6447755"/>
+            <a:ext cx="2292347" cy="300771"/>
+          </a:xfrm>
+          <a:prstGeom prst="rect">
+            <a:avLst/>
+          </a:prstGeom>
+          <a:ln>
+            <a:noFill/>
+          </a:ln>
+        </p:spPr>
+        <p:style>
+          <a:lnRef idx="2">
+            <a:schemeClr val="accent1">
+              <a:shade val="15000"/>
+            </a:schemeClr>
+          </a:lnRef>
+          <a:fillRef idx="1">
+            <a:schemeClr val="accent1"/>
+          </a:fillRef>
+          <a:effectRef idx="0">
+            <a:schemeClr val="accent1"/>
+          </a:effectRef>
+          <a:fontRef idx="minor">
+            <a:schemeClr val="lt1"/>
+          </a:fontRef>
+        </p:style>
+        <p:txBody>
+          <a:bodyPr rtlCol="0" anchor="ctr"/>
+          <a:lstStyle/>
+          <a:p>
+            <a:pPr algn="ctr"/>
+            <a:endParaRPr lang="en-US"/>
+          </a:p>
+        </p:txBody>
+      </p:sp>
+      <p:graphicFrame>
+        <p:nvGraphicFramePr>
+          <p:cNvPr id="6" name="Tabelle 5">
+            <a:extLst>
+              <a:ext uri="{FF2B5EF4-FFF2-40B4-BE49-F238E27FC236}">
+                <a16:creationId xmlns:a16="http://schemas.microsoft.com/office/drawing/2014/main" id="{C9995DAC-20D5-D37E-3E83-B17A023145AD}"/>
+              </a:ext>
+            </a:extLst>
+          </p:cNvPr>
+          <p:cNvGraphicFramePr>
+            <a:graphicFrameLocks noGrp="1"/>
+          </p:cNvGraphicFramePr>
+          <p:nvPr/>
+        </p:nvGraphicFramePr>
+        <p:xfrm>
+          <a:off x="799850" y="1779760"/>
+          <a:ext cx="10668249" cy="4319998"/>
+        </p:xfrm>
+        <a:graphic>
+          <a:graphicData uri="http://schemas.openxmlformats.org/drawingml/2006/table">
+            <a:tbl>
+              <a:tblPr firstRow="1" bandRow="1">
+                <a:tableStyleId>{5C22544A-7EE6-4342-B048-85BDC9FD1C3A}</a:tableStyleId>
+              </a:tblPr>
+              <a:tblGrid>
+                <a:gridCol w="3556083">
+                  <a:extLst>
+                    <a:ext uri="{9D8B030D-6E8A-4147-A177-3AD203B41FA5}">
+                      <a16:colId xmlns:a16="http://schemas.microsoft.com/office/drawing/2014/main" val="326771416"/>
+                    </a:ext>
+                  </a:extLst>
+                </a:gridCol>
+                <a:gridCol w="3556083">
+                  <a:extLst>
+                    <a:ext uri="{9D8B030D-6E8A-4147-A177-3AD203B41FA5}">
+                      <a16:colId xmlns:a16="http://schemas.microsoft.com/office/drawing/2014/main" val="395046651"/>
+                    </a:ext>
+                  </a:extLst>
+                </a:gridCol>
+                <a:gridCol w="3556083">
+                  <a:extLst>
+                    <a:ext uri="{9D8B030D-6E8A-4147-A177-3AD203B41FA5}">
+                      <a16:colId xmlns:a16="http://schemas.microsoft.com/office/drawing/2014/main" val="3240559516"/>
+                    </a:ext>
+                  </a:extLst>
+                </a:gridCol>
+              </a:tblGrid>
+              <a:tr h="794117">
+                <a:tc>
+                  <a:txBody>
+                    <a:bodyPr/>
+                    <a:lstStyle/>
+                    <a:p>
+                      <a:pPr algn="l"/>
+                      <a:r>
+                        <a:rPr lang="de-DE" dirty="0"/>
+                        <a:t>Aufgabe</a:t>
+                      </a:r>
+                    </a:p>
+                  </a:txBody>
+                  <a:tcPr anchor="ctr"/>
+                </a:tc>
+                <a:tc>
+                  <a:txBody>
+                    <a:bodyPr/>
+                    <a:lstStyle/>
+                    <a:p>
+                      <a:pPr algn="l"/>
+                      <a:r>
+                        <a:rPr lang="de-DE" dirty="0"/>
+                        <a:t>Problemstellung</a:t>
+                      </a:r>
+                    </a:p>
+                  </a:txBody>
+                  <a:tcPr anchor="ctr"/>
+                </a:tc>
+                <a:tc>
+                  <a:txBody>
+                    <a:bodyPr/>
+                    <a:lstStyle/>
+                    <a:p>
+                      <a:pPr algn="l"/>
+                      <a:r>
+                        <a:rPr lang="de-DE" dirty="0"/>
+                        <a:t>Lösungsansatz</a:t>
+                      </a:r>
+                    </a:p>
+                  </a:txBody>
+                  <a:tcPr anchor="ctr"/>
+                </a:tc>
+                <a:extLst>
+                  <a:ext uri="{0D108BD9-81ED-4DB2-BD59-A6C34878D82A}">
+                    <a16:rowId xmlns:a16="http://schemas.microsoft.com/office/drawing/2014/main" val="3395958491"/>
+                  </a:ext>
+                </a:extLst>
+              </a:tr>
+              <a:tr h="1143530">
+                <a:tc>
+                  <a:txBody>
+                    <a:bodyPr/>
+                    <a:lstStyle/>
+                    <a:p>
+                      <a:pPr algn="l"/>
+                      <a:r>
+                        <a:rPr lang="de-DE" dirty="0"/>
+                        <a:t>Deployment Prozess</a:t>
+                      </a:r>
+                    </a:p>
+                  </a:txBody>
+                  <a:tcPr anchor="ctr"/>
+                </a:tc>
+                <a:tc>
+                  <a:txBody>
+                    <a:bodyPr/>
+                    <a:lstStyle/>
+                    <a:p>
+                      <a:pPr algn="l"/>
+                      <a:r>
+                        <a:rPr lang="de-DE" dirty="0"/>
+                        <a:t>RaytRazor.exe benötigt Abhängigkeiten und Ressourcen</a:t>
+                      </a:r>
+                    </a:p>
+                  </a:txBody>
+                  <a:tcPr anchor="ctr"/>
+                </a:tc>
+                <a:tc>
+                  <a:txBody>
+                    <a:bodyPr/>
+                    <a:lstStyle/>
+                    <a:p>
+                      <a:pPr algn="l"/>
+                      <a:r>
+                        <a:rPr lang="de-DE" dirty="0"/>
+                        <a:t>Automatisierte Releases als      .</a:t>
+                      </a:r>
+                      <a:r>
+                        <a:rPr lang="de-DE" dirty="0" err="1"/>
+                        <a:t>zip</a:t>
+                      </a:r>
+                      <a:r>
+                        <a:rPr lang="de-DE" dirty="0"/>
+                        <a:t>-Archive über GitHub Action</a:t>
+                      </a:r>
+                    </a:p>
+                  </a:txBody>
+                  <a:tcPr anchor="ctr"/>
+                </a:tc>
+                <a:extLst>
+                  <a:ext uri="{0D108BD9-81ED-4DB2-BD59-A6C34878D82A}">
+                    <a16:rowId xmlns:a16="http://schemas.microsoft.com/office/drawing/2014/main" val="3333344902"/>
+                  </a:ext>
+                </a:extLst>
+              </a:tr>
+              <a:tr h="794117">
+                <a:tc>
+                  <a:txBody>
+                    <a:bodyPr/>
+                    <a:lstStyle/>
+                    <a:p>
+                      <a:pPr algn="l"/>
+                      <a:r>
+                        <a:rPr lang="de-DE" dirty="0"/>
+                        <a:t>Code Qualität &amp; Sicherheit</a:t>
+                      </a:r>
+                    </a:p>
+                  </a:txBody>
+                  <a:tcPr anchor="ctr"/>
+                </a:tc>
+                <a:tc>
+                  <a:txBody>
+                    <a:bodyPr/>
+                    <a:lstStyle/>
+                    <a:p>
+                      <a:pPr algn="l"/>
+                      <a:r>
+                        <a:rPr lang="de-DE" dirty="0"/>
+                        <a:t>C++ anfällig für Unsicherheiten</a:t>
+                      </a:r>
+                    </a:p>
+                  </a:txBody>
+                  <a:tcPr anchor="ctr"/>
+                </a:tc>
+                <a:tc>
+                  <a:txBody>
+                    <a:bodyPr/>
+                    <a:lstStyle/>
+                    <a:p>
+                      <a:pPr algn="l"/>
+                      <a:r>
+                        <a:rPr lang="de-DE" dirty="0"/>
+                        <a:t>Code-Scanning mittels </a:t>
+                      </a:r>
+                      <a:r>
+                        <a:rPr lang="de-DE" dirty="0" err="1"/>
+                        <a:t>CodeQL</a:t>
+                      </a:r>
+                      <a:endParaRPr lang="de-DE" dirty="0"/>
+                    </a:p>
+                  </a:txBody>
+                  <a:tcPr anchor="ctr"/>
+                </a:tc>
+                <a:extLst>
+                  <a:ext uri="{0D108BD9-81ED-4DB2-BD59-A6C34878D82A}">
+                    <a16:rowId xmlns:a16="http://schemas.microsoft.com/office/drawing/2014/main" val="4021716450"/>
+                  </a:ext>
+                </a:extLst>
+              </a:tr>
+              <a:tr h="794117">
+                <a:tc>
+                  <a:txBody>
+                    <a:bodyPr/>
+                    <a:lstStyle/>
+                    <a:p>
+                      <a:pPr algn="l"/>
+                      <a:r>
+                        <a:rPr lang="de-DE" dirty="0"/>
+                        <a:t>Raytracing Ansatz</a:t>
+                      </a:r>
+                    </a:p>
+                  </a:txBody>
+                  <a:tcPr anchor="ctr"/>
+                </a:tc>
+                <a:tc>
+                  <a:txBody>
+                    <a:bodyPr/>
+                    <a:lstStyle/>
+                    <a:p>
+                      <a:pPr marL="0" marR="0" lvl="0" indent="0" algn="l" defTabSz="914400" rtl="0" eaLnBrk="1" fontAlgn="auto" latinLnBrk="0" hangingPunct="1">
+                        <a:lnSpc>
+                          <a:spcPct val="100000"/>
+                        </a:lnSpc>
+                        <a:spcBef>
+                          <a:spcPts val="0"/>
+                        </a:spcBef>
+                        <a:spcAft>
+                          <a:spcPts val="0"/>
+                        </a:spcAft>
+                        <a:buClrTx/>
+                        <a:buSzTx/>
+                        <a:buFontTx/>
+                        <a:buNone/>
+                        <a:tabLst/>
+                        <a:defRPr/>
+                      </a:pPr>
+                      <a:r>
+                        <a:rPr lang="de-DE" dirty="0"/>
+                        <a:t>OpenGL arbeitet Buffer basiert</a:t>
+                      </a:r>
+                    </a:p>
+                  </a:txBody>
+                  <a:tcPr anchor="ctr"/>
+                </a:tc>
+                <a:tc>
+                  <a:txBody>
+                    <a:bodyPr/>
+                    <a:lstStyle/>
+                    <a:p>
+                      <a:pPr marL="0" marR="0" lvl="0" indent="0" algn="l" defTabSz="914400" rtl="0" eaLnBrk="1" fontAlgn="auto" latinLnBrk="0" hangingPunct="1">
+                        <a:lnSpc>
+                          <a:spcPct val="100000"/>
+                        </a:lnSpc>
+                        <a:spcBef>
+                          <a:spcPts val="0"/>
+                        </a:spcBef>
+                        <a:spcAft>
+                          <a:spcPts val="0"/>
+                        </a:spcAft>
+                        <a:buClrTx/>
+                        <a:buSzTx/>
+                        <a:buFontTx/>
+                        <a:buNone/>
+                        <a:tabLst/>
+                        <a:defRPr/>
+                      </a:pPr>
+                      <a:r>
+                        <a:rPr lang="de-DE" dirty="0"/>
+                        <a:t>SDL2 für Raytracing</a:t>
+                      </a:r>
+                    </a:p>
+                  </a:txBody>
+                  <a:tcPr anchor="ctr"/>
+                </a:tc>
+                <a:extLst>
+                  <a:ext uri="{0D108BD9-81ED-4DB2-BD59-A6C34878D82A}">
+                    <a16:rowId xmlns:a16="http://schemas.microsoft.com/office/drawing/2014/main" val="3430848897"/>
+                  </a:ext>
+                </a:extLst>
+              </a:tr>
+              <a:tr h="794117">
+                <a:tc>
+                  <a:txBody>
+                    <a:bodyPr/>
+                    <a:lstStyle/>
+                    <a:p>
+                      <a:pPr algn="l"/>
+                      <a:r>
+                        <a:rPr lang="de-DE" dirty="0"/>
+                        <a:t>Raytracing </a:t>
+                      </a:r>
+                      <a:r>
+                        <a:rPr lang="de-DE" dirty="0" err="1"/>
+                        <a:t>clashes</a:t>
+                      </a:r>
+                      <a:endParaRPr lang="de-DE" dirty="0"/>
+                    </a:p>
+                  </a:txBody>
+                  <a:tcPr anchor="ctr"/>
+                </a:tc>
+                <a:tc>
+                  <a:txBody>
+                    <a:bodyPr/>
+                    <a:lstStyle/>
+                    <a:p>
+                      <a:pPr algn="l"/>
+                      <a:r>
+                        <a:rPr lang="de-DE" dirty="0"/>
+                        <a:t>OpenGL und SDL2 </a:t>
+                      </a:r>
+                      <a:r>
+                        <a:rPr lang="de-DE" dirty="0" err="1"/>
+                        <a:t>loops</a:t>
+                      </a:r>
+                      <a:r>
+                        <a:rPr lang="de-DE" dirty="0"/>
+                        <a:t> </a:t>
+                      </a:r>
+                      <a:r>
+                        <a:rPr lang="de-DE" dirty="0" err="1"/>
+                        <a:t>clashen</a:t>
+                      </a:r>
+                      <a:endParaRPr lang="de-DE" dirty="0"/>
+                    </a:p>
+                  </a:txBody>
+                  <a:tcPr anchor="ctr"/>
+                </a:tc>
+                <a:tc>
+                  <a:txBody>
+                    <a:bodyPr/>
+                    <a:lstStyle/>
+                    <a:p>
+                      <a:pPr algn="l"/>
+                      <a:r>
+                        <a:rPr lang="de-DE" dirty="0"/>
+                        <a:t>Separater Thread für SDL2</a:t>
+                      </a:r>
+                    </a:p>
+                  </a:txBody>
+                  <a:tcPr anchor="ctr"/>
+                </a:tc>
+                <a:extLst>
+                  <a:ext uri="{0D108BD9-81ED-4DB2-BD59-A6C34878D82A}">
+                    <a16:rowId xmlns:a16="http://schemas.microsoft.com/office/drawing/2014/main" val="2030628694"/>
+                  </a:ext>
+                </a:extLst>
+              </a:tr>
+            </a:tbl>
+          </a:graphicData>
+        </a:graphic>
+      </p:graphicFrame>
+    </p:spTree>
+    <p:extLst>
+      <p:ext uri="{BB962C8B-B14F-4D97-AF65-F5344CB8AC3E}">
+        <p14:creationId xmlns:p14="http://schemas.microsoft.com/office/powerpoint/2010/main" val="1410503594"/>
+      </p:ext>
+    </p:extLst>
+  </p:cSld>
+  <p:clrMapOvr>
+    <a:masterClrMapping/>
+  </p:clrMapOvr>
+</p:sld>
+</file>
+
+<file path=ppt/slides/slide6.xml><?xml version="1.0" encoding="utf-8"?>
+<p:sld xmlns:a="http://schemas.openxmlformats.org/drawingml/2006/main" xmlns:r="http://schemas.openxmlformats.org/officeDocument/2006/relationships" xmlns:p="http://schemas.openxmlformats.org/presentationml/2006/main">
+  <p:cSld>
+    <p:bg>
+      <p:bgPr>
+        <a:solidFill>
+          <a:schemeClr val="bg1"/>
+        </a:solidFill>
+        <a:effectLst/>
+      </p:bgPr>
+    </p:bg>
+    <p:spTree>
+      <p:nvGrpSpPr>
+        <p:cNvPr id="1" name=""/>
+        <p:cNvGrpSpPr/>
+        <p:nvPr/>
+      </p:nvGrpSpPr>
+      <p:grpSpPr>
+        <a:xfrm>
+          <a:off x="0" y="0"/>
+          <a:ext cx="0" cy="0"/>
+          <a:chOff x="0" y="0"/>
+          <a:chExt cx="0" cy="0"/>
+        </a:xfrm>
+      </p:grpSpPr>
+      <p:sp useBgFill="1">
+        <p:nvSpPr>
+          <p:cNvPr id="8" name="Rectangle 7">
+            <a:extLst>
+              <a:ext uri="{FF2B5EF4-FFF2-40B4-BE49-F238E27FC236}">
+                <a16:creationId xmlns:a16="http://schemas.microsoft.com/office/drawing/2014/main" id="{4DA718D0-4865-4629-8134-44F68D41D574}"/>
+              </a:ext>
+              <a:ext uri="{C183D7F6-B498-43B3-948B-1728B52AA6E4}">
+                <adec:decorative xmlns:adec="http://schemas.microsoft.com/office/drawing/2017/decorative" val="1"/>
+              </a:ext>
+            </a:extLst>
+          </p:cNvPr>
+          <p:cNvSpPr>
+            <a:spLocks noGrp="1" noRot="1" noChangeAspect="1" noMove="1" noResize="1" noEditPoints="1" noAdjustHandles="1" noChangeArrowheads="1" noChangeShapeType="1" noTextEdit="1"/>
+          </p:cNvSpPr>
+          <p:nvPr>
+            <p:extLst>
+              <p:ext uri="{386F3935-93C4-4BCD-93E2-E3B085C9AB24}">
+                <p16:designElem xmlns:p16="http://schemas.microsoft.com/office/powerpoint/2015/main" val="1"/>
+              </p:ext>
+            </p:extLst>
+          </p:nvPr>
+        </p:nvSpPr>
+        <p:spPr>
+          <a:xfrm>
+            <a:off x="0" y="0"/>
+            <a:ext cx="12191999" cy="6857365"/>
+          </a:xfrm>
+          <a:prstGeom prst="rect">
+            <a:avLst/>
+          </a:prstGeom>
+          <a:ln>
+            <a:noFill/>
+          </a:ln>
+        </p:spPr>
+        <p:style>
+          <a:lnRef idx="2">
+            <a:schemeClr val="accent1">
+              <a:shade val="50000"/>
+            </a:schemeClr>
+          </a:lnRef>
+          <a:fillRef idx="1">
+            <a:schemeClr val="accent1"/>
+          </a:fillRef>
+          <a:effectRef idx="0">
+            <a:schemeClr val="accent1"/>
+          </a:effectRef>
+          <a:fontRef idx="minor">
+            <a:schemeClr val="lt1"/>
+          </a:fontRef>
+        </p:style>
+        <p:txBody>
+          <a:bodyPr rtlCol="0" anchor="ctr"/>
+          <a:lstStyle/>
+          <a:p>
+            <a:pPr marL="0" marR="0" lvl="0" indent="0" algn="ctr" defTabSz="457200" rtl="0" eaLnBrk="1" fontAlgn="auto" latinLnBrk="0" hangingPunct="1">
+              <a:lnSpc>
+                <a:spcPct val="100000"/>
+              </a:lnSpc>
+              <a:spcBef>
+                <a:spcPts val="0"/>
+              </a:spcBef>
+              <a:spcAft>
+                <a:spcPts val="0"/>
+              </a:spcAft>
+              <a:buClrTx/>
+              <a:buSzTx/>
+              <a:buFontTx/>
+              <a:buNone/>
+              <a:tabLst/>
+              <a:defRPr/>
+            </a:pPr>
+            <a:endParaRPr kumimoji="0" lang="en-US" sz="1800" b="0" i="0" u="none" strike="noStrike" kern="1200" cap="none" spc="0" normalizeH="0" baseline="0" noProof="0">
+              <a:ln>
+                <a:noFill/>
+              </a:ln>
+              <a:solidFill>
+                <a:prstClr val="white"/>
+              </a:solidFill>
+              <a:effectLst/>
+              <a:uLnTx/>
+              <a:uFillTx/>
+              <a:latin typeface="Aptos" panose="02110004020202020204"/>
+              <a:ea typeface="+mn-ea"/>
+              <a:cs typeface="+mn-cs"/>
+            </a:endParaRPr>
+          </a:p>
+        </p:txBody>
+      </p:sp>
+      <p:grpSp>
+        <p:nvGrpSpPr>
+          <p:cNvPr id="10" name="Group 9">
+            <a:extLst>
+              <a:ext uri="{FF2B5EF4-FFF2-40B4-BE49-F238E27FC236}">
+                <a16:creationId xmlns:a16="http://schemas.microsoft.com/office/drawing/2014/main" id="{65167ED7-6315-43AB-B1B6-C326D5FD8F84}"/>
+              </a:ext>
+              <a:ext uri="{C183D7F6-B498-43B3-948B-1728B52AA6E4}">
+                <adec:decorative xmlns:adec="http://schemas.microsoft.com/office/drawing/2017/decorative" val="1"/>
+              </a:ext>
+            </a:extLst>
+          </p:cNvPr>
+          <p:cNvGrpSpPr>
+            <a:grpSpLocks noGrp="1" noUngrp="1" noRot="1" noChangeAspect="1" noMove="1" noResize="1"/>
+          </p:cNvGrpSpPr>
+          <p:nvPr>
+            <p:extLst>
+              <p:ext uri="{386F3935-93C4-4BCD-93E2-E3B085C9AB24}">
+                <p16:designElem xmlns:p16="http://schemas.microsoft.com/office/powerpoint/2015/main" val="1"/>
+              </p:ext>
+            </p:extLst>
+          </p:nvPr>
+        </p:nvGrpSpPr>
+        <p:grpSpPr>
+          <a:xfrm rot="5400000">
+            <a:off x="-2340441" y="2666183"/>
+            <a:ext cx="5860051" cy="527712"/>
+            <a:chOff x="6081624" y="1998368"/>
+            <a:chExt cx="5613457" cy="782175"/>
+          </a:xfrm>
+          <a:solidFill>
+            <a:schemeClr val="accent4"/>
+          </a:solidFill>
+        </p:grpSpPr>
+        <p:sp>
+          <p:nvSpPr>
+            <p:cNvPr id="11" name="Rectangle 10">
+              <a:extLst>
+                <a:ext uri="{FF2B5EF4-FFF2-40B4-BE49-F238E27FC236}">
+                  <a16:creationId xmlns:a16="http://schemas.microsoft.com/office/drawing/2014/main" id="{EF4D8839-FB03-487D-ACC8-8BFEDD4FEBAE}"/>
+                </a:ext>
+                <a:ext uri="{C183D7F6-B498-43B3-948B-1728B52AA6E4}">
+                  <adec:decorative xmlns:adec="http://schemas.microsoft.com/office/drawing/2017/decorative" val="1"/>
+                </a:ext>
+              </a:extLst>
+            </p:cNvPr>
+            <p:cNvSpPr/>
+            <p:nvPr>
+              <p:extLst>
+                <p:ext uri="{386F3935-93C4-4BCD-93E2-E3B085C9AB24}">
+                  <p16:designElem xmlns:p16="http://schemas.microsoft.com/office/powerpoint/2015/main" val="1"/>
+                </p:ext>
+              </p:extLst>
+            </p:nvPr>
+          </p:nvSpPr>
+          <p:spPr>
+            <a:xfrm rot="5400000">
+              <a:off x="11228040" y="2313027"/>
+              <a:ext cx="781700" cy="152382"/>
+            </a:xfrm>
+            <a:prstGeom prst="rect">
+              <a:avLst/>
+            </a:prstGeom>
+            <a:grpFill/>
+            <a:ln>
+              <a:noFill/>
+            </a:ln>
+          </p:spPr>
+          <p:style>
+            <a:lnRef idx="2">
+              <a:schemeClr val="accent1">
+                <a:shade val="50000"/>
+              </a:schemeClr>
+            </a:lnRef>
+            <a:fillRef idx="1">
+              <a:schemeClr val="accent1"/>
+            </a:fillRef>
+            <a:effectRef idx="0">
+              <a:schemeClr val="accent1"/>
+            </a:effectRef>
+            <a:fontRef idx="minor">
+              <a:schemeClr val="lt1"/>
+            </a:fontRef>
+          </p:style>
+          <p:txBody>
+            <a:bodyPr rtlCol="0" anchor="ctr"/>
+            <a:lstStyle/>
+            <a:p>
+              <a:pPr marL="0" marR="0" lvl="0" indent="0" algn="ctr" defTabSz="457200" rtl="0" eaLnBrk="1" fontAlgn="auto" latinLnBrk="0" hangingPunct="1">
+                <a:lnSpc>
+                  <a:spcPct val="100000"/>
+                </a:lnSpc>
+                <a:spcBef>
+                  <a:spcPts val="0"/>
+                </a:spcBef>
+                <a:spcAft>
+                  <a:spcPts val="0"/>
+                </a:spcAft>
+                <a:buClrTx/>
+                <a:buSzTx/>
+                <a:buFontTx/>
+                <a:buNone/>
+                <a:tabLst/>
+                <a:defRPr/>
+              </a:pPr>
+              <a:endParaRPr kumimoji="0" lang="en-US" sz="1800" b="0" i="0" u="none" strike="noStrike" kern="1200" cap="none" spc="0" normalizeH="0" baseline="0" noProof="0">
+                <a:ln>
+                  <a:noFill/>
+                </a:ln>
+                <a:solidFill>
+                  <a:prstClr val="white"/>
+                </a:solidFill>
+                <a:effectLst/>
+                <a:uLnTx/>
+                <a:uFillTx/>
+                <a:latin typeface="Aptos" panose="02110004020202020204"/>
+                <a:ea typeface="+mn-ea"/>
+                <a:cs typeface="+mn-cs"/>
+              </a:endParaRPr>
+            </a:p>
+          </p:txBody>
+        </p:sp>
+        <p:sp>
+          <p:nvSpPr>
+            <p:cNvPr id="12" name="Rectangle 11">
+              <a:extLst>
+                <a:ext uri="{FF2B5EF4-FFF2-40B4-BE49-F238E27FC236}">
+                  <a16:creationId xmlns:a16="http://schemas.microsoft.com/office/drawing/2014/main" id="{0EF75023-9A3B-42FC-B704-61A8F7BEF415}"/>
+                </a:ext>
+                <a:ext uri="{C183D7F6-B498-43B3-948B-1728B52AA6E4}">
+                  <adec:decorative xmlns:adec="http://schemas.microsoft.com/office/drawing/2017/decorative" val="1"/>
+                </a:ext>
+              </a:extLst>
+            </p:cNvPr>
+            <p:cNvSpPr/>
+            <p:nvPr>
+              <p:extLst>
+                <p:ext uri="{386F3935-93C4-4BCD-93E2-E3B085C9AB24}">
+                  <p16:designElem xmlns:p16="http://schemas.microsoft.com/office/powerpoint/2015/main" val="1"/>
+                </p:ext>
+              </p:extLst>
+            </p:nvPr>
+          </p:nvSpPr>
+          <p:spPr>
+            <a:xfrm flipH="1" flipV="1">
+              <a:off x="6081624" y="1998844"/>
+              <a:ext cx="5372968" cy="781699"/>
+            </a:xfrm>
+            <a:prstGeom prst="rect">
+              <a:avLst/>
+            </a:prstGeom>
+            <a:grpFill/>
+            <a:ln>
+              <a:noFill/>
+            </a:ln>
+          </p:spPr>
+          <p:style>
+            <a:lnRef idx="2">
+              <a:schemeClr val="accent1">
+                <a:shade val="50000"/>
+              </a:schemeClr>
+            </a:lnRef>
+            <a:fillRef idx="1">
+              <a:schemeClr val="accent1"/>
+            </a:fillRef>
+            <a:effectRef idx="0">
+              <a:schemeClr val="accent1"/>
+            </a:effectRef>
+            <a:fontRef idx="minor">
+              <a:schemeClr val="lt1"/>
+            </a:fontRef>
+          </p:style>
+          <p:txBody>
+            <a:bodyPr rtlCol="0" anchor="ctr"/>
+            <a:lstStyle/>
+            <a:p>
+              <a:pPr marL="0" marR="0" lvl="0" indent="0" algn="ctr" defTabSz="457200" rtl="0" eaLnBrk="1" fontAlgn="auto" latinLnBrk="0" hangingPunct="1">
+                <a:lnSpc>
+                  <a:spcPct val="100000"/>
+                </a:lnSpc>
+                <a:spcBef>
+                  <a:spcPts val="0"/>
+                </a:spcBef>
+                <a:spcAft>
+                  <a:spcPts val="0"/>
+                </a:spcAft>
+                <a:buClrTx/>
+                <a:buSzTx/>
+                <a:buFontTx/>
+                <a:buNone/>
+                <a:tabLst/>
+                <a:defRPr/>
+              </a:pPr>
+              <a:endParaRPr kumimoji="0" lang="en-US" sz="1800" b="0" i="0" u="none" strike="noStrike" kern="1200" cap="none" spc="0" normalizeH="0" baseline="0" noProof="0">
+                <a:ln>
+                  <a:noFill/>
+                </a:ln>
+                <a:solidFill>
+                  <a:prstClr val="white"/>
+                </a:solidFill>
+                <a:effectLst/>
+                <a:uLnTx/>
+                <a:uFillTx/>
+                <a:latin typeface="Aptos" panose="02110004020202020204"/>
+                <a:ea typeface="+mn-ea"/>
+                <a:cs typeface="+mn-cs"/>
+              </a:endParaRPr>
+            </a:p>
+          </p:txBody>
+        </p:sp>
+      </p:grpSp>
+      <p:sp>
+        <p:nvSpPr>
+          <p:cNvPr id="14" name="Rectangle 13">
+            <a:extLst>
+              <a:ext uri="{FF2B5EF4-FFF2-40B4-BE49-F238E27FC236}">
+                <a16:creationId xmlns:a16="http://schemas.microsoft.com/office/drawing/2014/main" id="{CBC4F608-B4B8-48C3-9572-C0F061B1CD99}"/>
+              </a:ext>
+              <a:ext uri="{C183D7F6-B498-43B3-948B-1728B52AA6E4}">
+                <adec:decorative xmlns:adec="http://schemas.microsoft.com/office/drawing/2017/decorative" val="1"/>
+              </a:ext>
+            </a:extLst>
+          </p:cNvPr>
+          <p:cNvSpPr>
+            <a:spLocks noGrp="1" noRot="1" noChangeAspect="1" noMove="1" noResize="1" noEditPoints="1" noAdjustHandles="1" noChangeArrowheads="1" noChangeShapeType="1" noTextEdit="1"/>
+          </p:cNvSpPr>
+          <p:nvPr>
+            <p:extLst>
+              <p:ext uri="{386F3935-93C4-4BCD-93E2-E3B085C9AB24}">
+                <p16:designElem xmlns:p16="http://schemas.microsoft.com/office/powerpoint/2015/main" val="1"/>
+              </p:ext>
+            </p:extLst>
+          </p:nvPr>
+        </p:nvSpPr>
+        <p:spPr>
+          <a:xfrm>
+            <a:off x="579528" y="922919"/>
+            <a:ext cx="11111729" cy="5461252"/>
+          </a:xfrm>
+          <a:prstGeom prst="rect">
+            <a:avLst/>
+          </a:prstGeom>
+          <a:solidFill>
+            <a:schemeClr val="bg1"/>
+          </a:solidFill>
+          <a:ln>
+            <a:noFill/>
+          </a:ln>
+          <a:effectLst>
+            <a:outerShdw blurRad="139700" dist="127000" dir="5400000" algn="t" rotWithShape="0">
+              <a:prstClr val="black">
+                <a:alpha val="15000"/>
+              </a:prstClr>
+            </a:outerShdw>
+          </a:effectLst>
+        </p:spPr>
+        <p:style>
+          <a:lnRef idx="2">
+            <a:schemeClr val="accent1">
+              <a:shade val="50000"/>
+            </a:schemeClr>
+          </a:lnRef>
+          <a:fillRef idx="1">
+            <a:schemeClr val="accent1"/>
+          </a:fillRef>
+          <a:effectRef idx="0">
+            <a:schemeClr val="accent1"/>
+          </a:effectRef>
+          <a:fontRef idx="minor">
+            <a:schemeClr val="lt1"/>
+          </a:fontRef>
+        </p:style>
+        <p:txBody>
+          <a:bodyPr rtlCol="0" anchor="ctr"/>
+          <a:lstStyle/>
+          <a:p>
+            <a:pPr marL="0" marR="0" lvl="0" indent="0" algn="ctr" defTabSz="457200" rtl="0" eaLnBrk="1" fontAlgn="auto" latinLnBrk="0" hangingPunct="1">
+              <a:lnSpc>
+                <a:spcPct val="100000"/>
+              </a:lnSpc>
+              <a:spcBef>
+                <a:spcPts val="0"/>
+              </a:spcBef>
+              <a:spcAft>
+                <a:spcPts val="0"/>
+              </a:spcAft>
+              <a:buClrTx/>
+              <a:buSzTx/>
+              <a:buFontTx/>
+              <a:buNone/>
+              <a:tabLst/>
+              <a:defRPr/>
+            </a:pPr>
+            <a:endParaRPr kumimoji="0" lang="en-US" sz="1800" b="0" i="0" u="none" strike="noStrike" kern="1200" cap="none" spc="0" normalizeH="0" baseline="0" noProof="0">
+              <a:ln>
+                <a:noFill/>
+              </a:ln>
+              <a:solidFill>
+                <a:prstClr val="white"/>
+              </a:solidFill>
+              <a:effectLst/>
+              <a:uLnTx/>
+              <a:uFillTx/>
+              <a:latin typeface="Aptos" panose="02110004020202020204"/>
+              <a:ea typeface="+mn-ea"/>
+              <a:cs typeface="+mn-cs"/>
+            </a:endParaRPr>
+          </a:p>
+        </p:txBody>
+      </p:sp>
+      <p:sp>
+        <p:nvSpPr>
+          <p:cNvPr id="2" name="Title 1">
+            <a:extLst>
+              <a:ext uri="{FF2B5EF4-FFF2-40B4-BE49-F238E27FC236}">
+                <a16:creationId xmlns:a16="http://schemas.microsoft.com/office/drawing/2014/main" id="{871EB858-F175-E6AC-337E-D5156AB19A16}"/>
+              </a:ext>
+            </a:extLst>
+          </p:cNvPr>
+          <p:cNvSpPr>
+            <a:spLocks noGrp="1"/>
+          </p:cNvSpPr>
+          <p:nvPr>
+            <p:ph type="title"/>
+          </p:nvPr>
+        </p:nvSpPr>
+        <p:spPr>
+          <a:xfrm>
+            <a:off x="1106599" y="117940"/>
+            <a:ext cx="9849751" cy="1349671"/>
+          </a:xfrm>
+        </p:spPr>
+        <p:txBody>
+          <a:bodyPr anchor="b">
+            <a:normAutofit/>
+          </a:bodyPr>
+          <a:lstStyle/>
+          <a:p>
+            <a:r>
+              <a:rPr lang="de-DE" sz="5400" u="sng" dirty="0"/>
+              <a:t>Bild-Quellen:</a:t>
+            </a:r>
+            <a:endParaRPr lang="en-US" sz="5400" u="sng" dirty="0"/>
+          </a:p>
+        </p:txBody>
+      </p:sp>
+      <p:sp>
+        <p:nvSpPr>
+          <p:cNvPr id="3" name="Content Placeholder 2">
+            <a:extLst>
+              <a:ext uri="{FF2B5EF4-FFF2-40B4-BE49-F238E27FC236}">
+                <a16:creationId xmlns:a16="http://schemas.microsoft.com/office/drawing/2014/main" id="{1BB53943-D017-C635-68DF-02E2F33B4CC1}"/>
+              </a:ext>
+            </a:extLst>
+          </p:cNvPr>
+          <p:cNvSpPr>
+            <a:spLocks noGrp="1"/>
+          </p:cNvSpPr>
+          <p:nvPr>
+            <p:ph idx="1"/>
+          </p:nvPr>
+        </p:nvSpPr>
+        <p:spPr>
+          <a:xfrm>
+            <a:off x="915336" y="2049667"/>
+            <a:ext cx="10232275" cy="4571101"/>
+          </a:xfrm>
+        </p:spPr>
+        <p:txBody>
+          <a:bodyPr anchor="ctr">
+            <a:noAutofit/>
+          </a:bodyPr>
+          <a:lstStyle/>
+          <a:p>
+            <a:r>
+              <a:rPr lang="en-US" sz="1600" dirty="0"/>
+              <a:t>RayForge / RaytRazor-Logos: </a:t>
+            </a:r>
+            <a:r>
+              <a:rPr lang="en-US" sz="1600" dirty="0">
+                <a:hlinkClick r:id="rId2"/>
+              </a:rPr>
+              <a:t>https://chatgpt.com/g/g-9i7ARxKhj-logo</a:t>
+            </a:r>
+            <a:endParaRPr lang="en-US" sz="1600" dirty="0"/>
+          </a:p>
+          <a:p>
+            <a:r>
+              <a:rPr lang="en-US" sz="1600" dirty="0"/>
+              <a:t>GitHub: </a:t>
+            </a:r>
+            <a:r>
+              <a:rPr lang="en-US" sz="1600" dirty="0">
+                <a:hlinkClick r:id="rId3"/>
+              </a:rPr>
+              <a:t>https://cdn-icons-png.flaticon.com/512/25/25231.png</a:t>
+            </a:r>
+            <a:r>
+              <a:rPr lang="en-US" sz="1600" dirty="0"/>
+              <a:t> </a:t>
+            </a:r>
+          </a:p>
+          <a:p>
+            <a:r>
+              <a:rPr lang="en-US" sz="1600" dirty="0"/>
+              <a:t>GitHub Actions: </a:t>
+            </a:r>
+            <a:r>
+              <a:rPr lang="en-US" sz="1600" dirty="0">
+                <a:hlinkClick r:id="rId4"/>
+              </a:rPr>
+              <a:t>https://itsopensource.com/static/42143b9a1f8f163ccc6f87d27cc83674/ee604/github-actions.png</a:t>
+            </a:r>
+            <a:r>
+              <a:rPr lang="en-US" sz="1600" dirty="0"/>
+              <a:t> </a:t>
+            </a:r>
+          </a:p>
+          <a:p>
+            <a:r>
+              <a:rPr lang="en-US" sz="1600" dirty="0"/>
+              <a:t>C++: </a:t>
+            </a:r>
+            <a:r>
+              <a:rPr lang="en-US" sz="1600" dirty="0">
+                <a:hlinkClick r:id="rId5"/>
+              </a:rPr>
+              <a:t>https://www.pngwing.com/en/free-png-nwvsu</a:t>
+            </a:r>
+            <a:r>
+              <a:rPr lang="en-US" sz="1600" dirty="0"/>
+              <a:t> </a:t>
+            </a:r>
+          </a:p>
+          <a:p>
+            <a:r>
+              <a:rPr lang="en-US" sz="1600" dirty="0"/>
+              <a:t>Teams: </a:t>
+            </a:r>
+            <a:r>
+              <a:rPr lang="en-US" sz="1600" dirty="0">
+                <a:hlinkClick r:id="rId6"/>
+              </a:rPr>
+              <a:t>https://www.stickpng.com/de/img/karikaturen/handy-manny/microsoft-teams-logo</a:t>
+            </a:r>
+            <a:r>
+              <a:rPr lang="en-US" sz="1600" dirty="0"/>
+              <a:t> </a:t>
+            </a:r>
+          </a:p>
+          <a:p>
+            <a:r>
+              <a:rPr lang="en-US" sz="1600" dirty="0"/>
+              <a:t>Discord: </a:t>
+            </a:r>
+            <a:r>
+              <a:rPr lang="en-US" sz="1600" dirty="0">
+                <a:hlinkClick r:id="rId7"/>
+              </a:rPr>
+              <a:t>https://icons8.de/icons/set/discord-logo</a:t>
+            </a:r>
+            <a:endParaRPr lang="en-US" sz="1600" dirty="0"/>
+          </a:p>
+          <a:p>
+            <a:r>
+              <a:rPr lang="en-US" sz="1600" dirty="0"/>
+              <a:t>OpenGL: </a:t>
+            </a:r>
+            <a:r>
+              <a:rPr lang="en-US" sz="1600" dirty="0">
+                <a:hlinkClick r:id="rId8"/>
+              </a:rPr>
+              <a:t>https://www.pngegg.com/en/png-yogek</a:t>
+            </a:r>
+            <a:endParaRPr lang="en-US" sz="1600" dirty="0"/>
+          </a:p>
+          <a:p>
+            <a:r>
+              <a:rPr lang="en-US" sz="1600" dirty="0"/>
+              <a:t>SDL: </a:t>
+            </a:r>
+            <a:r>
+              <a:rPr lang="en-US" sz="1600" dirty="0">
+                <a:hlinkClick r:id="rId9"/>
+              </a:rPr>
+              <a:t>https://www.pngkit.com/png/detail/183-1831304_sdl-logo-image-credit-simple-directmedia-layer.png</a:t>
+            </a:r>
+            <a:endParaRPr lang="en-US" sz="1600" dirty="0"/>
+          </a:p>
+          <a:p>
+            <a:r>
+              <a:rPr lang="en-US" sz="1600" dirty="0"/>
+              <a:t>Boost: </a:t>
+            </a:r>
+            <a:r>
+              <a:rPr lang="en-US" sz="1600" dirty="0">
+                <a:hlinkClick r:id="rId10"/>
+              </a:rPr>
+              <a:t>https://raw.githubusercontent.com/boostorg/Artwork/refs/heads/master/boost-277x86-white.png</a:t>
+            </a:r>
+            <a:r>
+              <a:rPr lang="en-US" sz="1600" dirty="0"/>
+              <a:t>  </a:t>
+            </a:r>
+          </a:p>
+          <a:p>
+            <a:pPr marL="0" indent="0">
+              <a:buNone/>
+            </a:pPr>
+            <a:endParaRPr lang="en-US" sz="1600" dirty="0"/>
+          </a:p>
+          <a:p>
+            <a:endParaRPr lang="en-US" sz="1600" dirty="0"/>
+          </a:p>
+          <a:p>
+            <a:endParaRPr lang="en-US" sz="1600" dirty="0"/>
+          </a:p>
+        </p:txBody>
+      </p:sp>
+    </p:spTree>
+    <p:extLst>
+      <p:ext uri="{BB962C8B-B14F-4D97-AF65-F5344CB8AC3E}">
+        <p14:creationId xmlns:p14="http://schemas.microsoft.com/office/powerpoint/2010/main" val="3495534188"/>
       </p:ext>
     </p:extLst>
   </p:cSld>

</xml_diff>